<commit_message>
Updates course content and presentation materials
Refreshes the course introduction and design presentation slides with updated content.

[New]
- Adds information regarding course resources.

[Modified]
- Adjusts presentation layouts and content for clarity and accuracy.

sc-XXXX
</commit_message>
<xml_diff>
--- a/presentations/01-course-introduction.pptx
+++ b/presentations/01-course-introduction.pptx
@@ -9,7 +9,7 @@
   </p:notesMasterIdLst>
   <p:sldIdLst>
     <p:sldId id="345" r:id="rId2"/>
-    <p:sldId id="346" r:id="rId3"/>
+    <p:sldId id="395" r:id="rId3"/>
     <p:sldId id="347" r:id="rId4"/>
     <p:sldId id="367" r:id="rId5"/>
     <p:sldId id="366" r:id="rId6"/>
@@ -148,2437 +148,6 @@
     </p:extLst>
   </p:cmAuthor>
 </p:cmAuthorLst>
-</file>
-
-<file path=ppt/diagrams/colors1.xml><?xml version="1.0" encoding="utf-8"?>
-<dgm:colorsDef xmlns:dgm="http://schemas.openxmlformats.org/drawingml/2006/diagram" xmlns:a="http://schemas.openxmlformats.org/drawingml/2006/main" uniqueId="urn:microsoft.com/office/officeart/2005/8/colors/accent1_2">
-  <dgm:title val=""/>
-  <dgm:desc val=""/>
-  <dgm:catLst>
-    <dgm:cat type="accent1" pri="11200"/>
-  </dgm:catLst>
-  <dgm:styleLbl name="node0">
-    <dgm:fillClrLst meth="repeat">
-      <a:schemeClr val="accent1"/>
-    </dgm:fillClrLst>
-    <dgm:linClrLst meth="repeat">
-      <a:schemeClr val="lt1"/>
-    </dgm:linClrLst>
-    <dgm:effectClrLst/>
-    <dgm:txLinClrLst/>
-    <dgm:txFillClrLst/>
-    <dgm:txEffectClrLst/>
-  </dgm:styleLbl>
-  <dgm:styleLbl name="alignNode1">
-    <dgm:fillClrLst meth="repeat">
-      <a:schemeClr val="accent1"/>
-    </dgm:fillClrLst>
-    <dgm:linClrLst meth="repeat">
-      <a:schemeClr val="accent1"/>
-    </dgm:linClrLst>
-    <dgm:effectClrLst/>
-    <dgm:txLinClrLst/>
-    <dgm:txFillClrLst/>
-    <dgm:txEffectClrLst/>
-  </dgm:styleLbl>
-  <dgm:styleLbl name="node1">
-    <dgm:fillClrLst meth="repeat">
-      <a:schemeClr val="accent1"/>
-    </dgm:fillClrLst>
-    <dgm:linClrLst meth="repeat">
-      <a:schemeClr val="lt1"/>
-    </dgm:linClrLst>
-    <dgm:effectClrLst/>
-    <dgm:txLinClrLst/>
-    <dgm:txFillClrLst/>
-    <dgm:txEffectClrLst/>
-  </dgm:styleLbl>
-  <dgm:styleLbl name="lnNode1">
-    <dgm:fillClrLst meth="repeat">
-      <a:schemeClr val="accent1"/>
-    </dgm:fillClrLst>
-    <dgm:linClrLst meth="repeat">
-      <a:schemeClr val="lt1"/>
-    </dgm:linClrLst>
-    <dgm:effectClrLst/>
-    <dgm:txLinClrLst/>
-    <dgm:txFillClrLst/>
-    <dgm:txEffectClrLst/>
-  </dgm:styleLbl>
-  <dgm:styleLbl name="vennNode1">
-    <dgm:fillClrLst meth="repeat">
-      <a:schemeClr val="accent1">
-        <a:alpha val="50000"/>
-      </a:schemeClr>
-    </dgm:fillClrLst>
-    <dgm:linClrLst meth="repeat">
-      <a:schemeClr val="lt1"/>
-    </dgm:linClrLst>
-    <dgm:effectClrLst/>
-    <dgm:txLinClrLst/>
-    <dgm:txFillClrLst/>
-    <dgm:txEffectClrLst/>
-  </dgm:styleLbl>
-  <dgm:styleLbl name="node2">
-    <dgm:fillClrLst meth="repeat">
-      <a:schemeClr val="accent1"/>
-    </dgm:fillClrLst>
-    <dgm:linClrLst meth="repeat">
-      <a:schemeClr val="lt1"/>
-    </dgm:linClrLst>
-    <dgm:effectClrLst/>
-    <dgm:txLinClrLst/>
-    <dgm:txFillClrLst/>
-    <dgm:txEffectClrLst/>
-  </dgm:styleLbl>
-  <dgm:styleLbl name="node3">
-    <dgm:fillClrLst meth="repeat">
-      <a:schemeClr val="accent1"/>
-    </dgm:fillClrLst>
-    <dgm:linClrLst meth="repeat">
-      <a:schemeClr val="lt1"/>
-    </dgm:linClrLst>
-    <dgm:effectClrLst/>
-    <dgm:txLinClrLst/>
-    <dgm:txFillClrLst/>
-    <dgm:txEffectClrLst/>
-  </dgm:styleLbl>
-  <dgm:styleLbl name="node4">
-    <dgm:fillClrLst meth="repeat">
-      <a:schemeClr val="accent1"/>
-    </dgm:fillClrLst>
-    <dgm:linClrLst meth="repeat">
-      <a:schemeClr val="lt1"/>
-    </dgm:linClrLst>
-    <dgm:effectClrLst/>
-    <dgm:txLinClrLst/>
-    <dgm:txFillClrLst/>
-    <dgm:txEffectClrLst/>
-  </dgm:styleLbl>
-  <dgm:styleLbl name="fgImgPlace1">
-    <dgm:fillClrLst meth="repeat">
-      <a:schemeClr val="accent1">
-        <a:tint val="50000"/>
-      </a:schemeClr>
-    </dgm:fillClrLst>
-    <dgm:linClrLst meth="repeat">
-      <a:schemeClr val="lt1"/>
-    </dgm:linClrLst>
-    <dgm:effectClrLst/>
-    <dgm:txLinClrLst/>
-    <dgm:txFillClrLst meth="repeat">
-      <a:schemeClr val="lt1"/>
-    </dgm:txFillClrLst>
-    <dgm:txEffectClrLst/>
-  </dgm:styleLbl>
-  <dgm:styleLbl name="alignImgPlace1">
-    <dgm:fillClrLst meth="repeat">
-      <a:schemeClr val="accent1">
-        <a:tint val="50000"/>
-      </a:schemeClr>
-    </dgm:fillClrLst>
-    <dgm:linClrLst meth="repeat">
-      <a:schemeClr val="lt1"/>
-    </dgm:linClrLst>
-    <dgm:effectClrLst/>
-    <dgm:txLinClrLst/>
-    <dgm:txFillClrLst meth="repeat">
-      <a:schemeClr val="lt1"/>
-    </dgm:txFillClrLst>
-    <dgm:txEffectClrLst/>
-  </dgm:styleLbl>
-  <dgm:styleLbl name="bgImgPlace1">
-    <dgm:fillClrLst meth="repeat">
-      <a:schemeClr val="accent1">
-        <a:tint val="50000"/>
-      </a:schemeClr>
-    </dgm:fillClrLst>
-    <dgm:linClrLst meth="repeat">
-      <a:schemeClr val="lt1"/>
-    </dgm:linClrLst>
-    <dgm:effectClrLst/>
-    <dgm:txLinClrLst/>
-    <dgm:txFillClrLst meth="repeat">
-      <a:schemeClr val="lt1"/>
-    </dgm:txFillClrLst>
-    <dgm:txEffectClrLst/>
-  </dgm:styleLbl>
-  <dgm:styleLbl name="sibTrans2D1">
-    <dgm:fillClrLst meth="repeat">
-      <a:schemeClr val="accent1">
-        <a:tint val="60000"/>
-      </a:schemeClr>
-    </dgm:fillClrLst>
-    <dgm:linClrLst meth="repeat">
-      <a:schemeClr val="accent1">
-        <a:tint val="60000"/>
-      </a:schemeClr>
-    </dgm:linClrLst>
-    <dgm:effectClrLst/>
-    <dgm:txLinClrLst/>
-    <dgm:txFillClrLst/>
-    <dgm:txEffectClrLst/>
-  </dgm:styleLbl>
-  <dgm:styleLbl name="fgSibTrans2D1">
-    <dgm:fillClrLst meth="repeat">
-      <a:schemeClr val="accent1">
-        <a:tint val="60000"/>
-      </a:schemeClr>
-    </dgm:fillClrLst>
-    <dgm:linClrLst meth="repeat">
-      <a:schemeClr val="accent1">
-        <a:tint val="60000"/>
-      </a:schemeClr>
-    </dgm:linClrLst>
-    <dgm:effectClrLst/>
-    <dgm:txLinClrLst/>
-    <dgm:txFillClrLst/>
-    <dgm:txEffectClrLst/>
-  </dgm:styleLbl>
-  <dgm:styleLbl name="bgSibTrans2D1">
-    <dgm:fillClrLst meth="repeat">
-      <a:schemeClr val="accent1">
-        <a:tint val="60000"/>
-      </a:schemeClr>
-    </dgm:fillClrLst>
-    <dgm:linClrLst meth="repeat">
-      <a:schemeClr val="accent1">
-        <a:tint val="60000"/>
-      </a:schemeClr>
-    </dgm:linClrLst>
-    <dgm:effectClrLst/>
-    <dgm:txLinClrLst/>
-    <dgm:txFillClrLst/>
-    <dgm:txEffectClrLst/>
-  </dgm:styleLbl>
-  <dgm:styleLbl name="sibTrans1D1">
-    <dgm:fillClrLst meth="repeat">
-      <a:schemeClr val="accent1"/>
-    </dgm:fillClrLst>
-    <dgm:linClrLst meth="repeat">
-      <a:schemeClr val="accent1"/>
-    </dgm:linClrLst>
-    <dgm:effectClrLst/>
-    <dgm:txLinClrLst/>
-    <dgm:txFillClrLst meth="repeat">
-      <a:schemeClr val="tx1"/>
-    </dgm:txFillClrLst>
-    <dgm:txEffectClrLst/>
-  </dgm:styleLbl>
-  <dgm:styleLbl name="callout">
-    <dgm:fillClrLst meth="repeat">
-      <a:schemeClr val="accent1"/>
-    </dgm:fillClrLst>
-    <dgm:linClrLst meth="repeat">
-      <a:schemeClr val="accent1">
-        <a:tint val="50000"/>
-      </a:schemeClr>
-    </dgm:linClrLst>
-    <dgm:effectClrLst/>
-    <dgm:txLinClrLst/>
-    <dgm:txFillClrLst meth="repeat">
-      <a:schemeClr val="tx1"/>
-    </dgm:txFillClrLst>
-    <dgm:txEffectClrLst/>
-  </dgm:styleLbl>
-  <dgm:styleLbl name="asst0">
-    <dgm:fillClrLst meth="repeat">
-      <a:schemeClr val="accent1"/>
-    </dgm:fillClrLst>
-    <dgm:linClrLst meth="repeat">
-      <a:schemeClr val="lt1"/>
-    </dgm:linClrLst>
-    <dgm:effectClrLst/>
-    <dgm:txLinClrLst/>
-    <dgm:txFillClrLst/>
-    <dgm:txEffectClrLst/>
-  </dgm:styleLbl>
-  <dgm:styleLbl name="asst1">
-    <dgm:fillClrLst meth="repeat">
-      <a:schemeClr val="accent1"/>
-    </dgm:fillClrLst>
-    <dgm:linClrLst meth="repeat">
-      <a:schemeClr val="lt1"/>
-    </dgm:linClrLst>
-    <dgm:effectClrLst/>
-    <dgm:txLinClrLst/>
-    <dgm:txFillClrLst/>
-    <dgm:txEffectClrLst/>
-  </dgm:styleLbl>
-  <dgm:styleLbl name="asst2">
-    <dgm:fillClrLst meth="repeat">
-      <a:schemeClr val="accent1"/>
-    </dgm:fillClrLst>
-    <dgm:linClrLst meth="repeat">
-      <a:schemeClr val="lt1"/>
-    </dgm:linClrLst>
-    <dgm:effectClrLst/>
-    <dgm:txLinClrLst/>
-    <dgm:txFillClrLst/>
-    <dgm:txEffectClrLst/>
-  </dgm:styleLbl>
-  <dgm:styleLbl name="asst3">
-    <dgm:fillClrLst meth="repeat">
-      <a:schemeClr val="accent1"/>
-    </dgm:fillClrLst>
-    <dgm:linClrLst meth="repeat">
-      <a:schemeClr val="lt1"/>
-    </dgm:linClrLst>
-    <dgm:effectClrLst/>
-    <dgm:txLinClrLst/>
-    <dgm:txFillClrLst/>
-    <dgm:txEffectClrLst/>
-  </dgm:styleLbl>
-  <dgm:styleLbl name="asst4">
-    <dgm:fillClrLst meth="repeat">
-      <a:schemeClr val="accent1"/>
-    </dgm:fillClrLst>
-    <dgm:linClrLst meth="repeat">
-      <a:schemeClr val="lt1"/>
-    </dgm:linClrLst>
-    <dgm:effectClrLst/>
-    <dgm:txLinClrLst/>
-    <dgm:txFillClrLst/>
-    <dgm:txEffectClrLst/>
-  </dgm:styleLbl>
-  <dgm:styleLbl name="parChTrans2D1">
-    <dgm:fillClrLst meth="repeat">
-      <a:schemeClr val="accent1">
-        <a:tint val="60000"/>
-      </a:schemeClr>
-    </dgm:fillClrLst>
-    <dgm:linClrLst meth="repeat">
-      <a:schemeClr val="accent1">
-        <a:tint val="60000"/>
-      </a:schemeClr>
-    </dgm:linClrLst>
-    <dgm:effectClrLst/>
-    <dgm:txLinClrLst/>
-    <dgm:txFillClrLst meth="repeat">
-      <a:schemeClr val="lt1"/>
-    </dgm:txFillClrLst>
-    <dgm:txEffectClrLst/>
-  </dgm:styleLbl>
-  <dgm:styleLbl name="parChTrans2D2">
-    <dgm:fillClrLst meth="repeat">
-      <a:schemeClr val="accent1"/>
-    </dgm:fillClrLst>
-    <dgm:linClrLst meth="repeat">
-      <a:schemeClr val="accent1"/>
-    </dgm:linClrLst>
-    <dgm:effectClrLst/>
-    <dgm:txLinClrLst/>
-    <dgm:txFillClrLst meth="repeat">
-      <a:schemeClr val="lt1"/>
-    </dgm:txFillClrLst>
-    <dgm:txEffectClrLst/>
-  </dgm:styleLbl>
-  <dgm:styleLbl name="parChTrans2D3">
-    <dgm:fillClrLst meth="repeat">
-      <a:schemeClr val="accent1"/>
-    </dgm:fillClrLst>
-    <dgm:linClrLst meth="repeat">
-      <a:schemeClr val="accent1"/>
-    </dgm:linClrLst>
-    <dgm:effectClrLst/>
-    <dgm:txLinClrLst/>
-    <dgm:txFillClrLst meth="repeat">
-      <a:schemeClr val="lt1"/>
-    </dgm:txFillClrLst>
-    <dgm:txEffectClrLst/>
-  </dgm:styleLbl>
-  <dgm:styleLbl name="parChTrans2D4">
-    <dgm:fillClrLst meth="repeat">
-      <a:schemeClr val="accent1"/>
-    </dgm:fillClrLst>
-    <dgm:linClrLst meth="repeat">
-      <a:schemeClr val="accent1"/>
-    </dgm:linClrLst>
-    <dgm:effectClrLst/>
-    <dgm:txLinClrLst/>
-    <dgm:txFillClrLst meth="repeat">
-      <a:schemeClr val="lt1"/>
-    </dgm:txFillClrLst>
-    <dgm:txEffectClrLst/>
-  </dgm:styleLbl>
-  <dgm:styleLbl name="parChTrans1D1">
-    <dgm:fillClrLst meth="repeat">
-      <a:schemeClr val="accent1"/>
-    </dgm:fillClrLst>
-    <dgm:linClrLst meth="repeat">
-      <a:schemeClr val="accent1">
-        <a:shade val="60000"/>
-      </a:schemeClr>
-    </dgm:linClrLst>
-    <dgm:effectClrLst/>
-    <dgm:txLinClrLst/>
-    <dgm:txFillClrLst meth="repeat">
-      <a:schemeClr val="tx1"/>
-    </dgm:txFillClrLst>
-    <dgm:txEffectClrLst/>
-  </dgm:styleLbl>
-  <dgm:styleLbl name="parChTrans1D2">
-    <dgm:fillClrLst meth="repeat">
-      <a:schemeClr val="accent1"/>
-    </dgm:fillClrLst>
-    <dgm:linClrLst meth="repeat">
-      <a:schemeClr val="accent1">
-        <a:shade val="60000"/>
-      </a:schemeClr>
-    </dgm:linClrLst>
-    <dgm:effectClrLst/>
-    <dgm:txLinClrLst/>
-    <dgm:txFillClrLst meth="repeat">
-      <a:schemeClr val="tx1"/>
-    </dgm:txFillClrLst>
-    <dgm:txEffectClrLst/>
-  </dgm:styleLbl>
-  <dgm:styleLbl name="parChTrans1D3">
-    <dgm:fillClrLst meth="repeat">
-      <a:schemeClr val="accent1"/>
-    </dgm:fillClrLst>
-    <dgm:linClrLst meth="repeat">
-      <a:schemeClr val="accent1">
-        <a:shade val="80000"/>
-      </a:schemeClr>
-    </dgm:linClrLst>
-    <dgm:effectClrLst/>
-    <dgm:txLinClrLst/>
-    <dgm:txFillClrLst meth="repeat">
-      <a:schemeClr val="tx1"/>
-    </dgm:txFillClrLst>
-    <dgm:txEffectClrLst/>
-  </dgm:styleLbl>
-  <dgm:styleLbl name="parChTrans1D4">
-    <dgm:fillClrLst meth="repeat">
-      <a:schemeClr val="accent1"/>
-    </dgm:fillClrLst>
-    <dgm:linClrLst meth="repeat">
-      <a:schemeClr val="accent1">
-        <a:shade val="80000"/>
-      </a:schemeClr>
-    </dgm:linClrLst>
-    <dgm:effectClrLst/>
-    <dgm:txLinClrLst/>
-    <dgm:txFillClrLst meth="repeat">
-      <a:schemeClr val="tx1"/>
-    </dgm:txFillClrLst>
-    <dgm:txEffectClrLst/>
-  </dgm:styleLbl>
-  <dgm:styleLbl name="fgAcc1">
-    <dgm:fillClrLst meth="repeat">
-      <a:schemeClr val="lt1">
-        <a:alpha val="90000"/>
-      </a:schemeClr>
-    </dgm:fillClrLst>
-    <dgm:linClrLst meth="repeat">
-      <a:schemeClr val="accent1"/>
-    </dgm:linClrLst>
-    <dgm:effectClrLst/>
-    <dgm:txLinClrLst/>
-    <dgm:txFillClrLst meth="repeat">
-      <a:schemeClr val="dk1"/>
-    </dgm:txFillClrLst>
-    <dgm:txEffectClrLst/>
-  </dgm:styleLbl>
-  <dgm:styleLbl name="conFgAcc1">
-    <dgm:fillClrLst meth="repeat">
-      <a:schemeClr val="lt1">
-        <a:alpha val="90000"/>
-      </a:schemeClr>
-    </dgm:fillClrLst>
-    <dgm:linClrLst meth="repeat">
-      <a:schemeClr val="accent1"/>
-    </dgm:linClrLst>
-    <dgm:effectClrLst/>
-    <dgm:txLinClrLst/>
-    <dgm:txFillClrLst meth="repeat">
-      <a:schemeClr val="dk1"/>
-    </dgm:txFillClrLst>
-    <dgm:txEffectClrLst/>
-  </dgm:styleLbl>
-  <dgm:styleLbl name="alignAcc1">
-    <dgm:fillClrLst meth="repeat">
-      <a:schemeClr val="lt1">
-        <a:alpha val="90000"/>
-      </a:schemeClr>
-    </dgm:fillClrLst>
-    <dgm:linClrLst meth="repeat">
-      <a:schemeClr val="accent1"/>
-    </dgm:linClrLst>
-    <dgm:effectClrLst/>
-    <dgm:txLinClrLst/>
-    <dgm:txFillClrLst meth="repeat">
-      <a:schemeClr val="dk1"/>
-    </dgm:txFillClrLst>
-    <dgm:txEffectClrLst/>
-  </dgm:styleLbl>
-  <dgm:styleLbl name="trAlignAcc1">
-    <dgm:fillClrLst meth="repeat">
-      <a:schemeClr val="lt1">
-        <a:alpha val="40000"/>
-      </a:schemeClr>
-    </dgm:fillClrLst>
-    <dgm:linClrLst meth="repeat">
-      <a:schemeClr val="accent1"/>
-    </dgm:linClrLst>
-    <dgm:effectClrLst/>
-    <dgm:txLinClrLst/>
-    <dgm:txFillClrLst meth="repeat">
-      <a:schemeClr val="dk1"/>
-    </dgm:txFillClrLst>
-    <dgm:txEffectClrLst/>
-  </dgm:styleLbl>
-  <dgm:styleLbl name="bgAcc1">
-    <dgm:fillClrLst meth="repeat">
-      <a:schemeClr val="lt1">
-        <a:alpha val="90000"/>
-      </a:schemeClr>
-    </dgm:fillClrLst>
-    <dgm:linClrLst meth="repeat">
-      <a:schemeClr val="accent1"/>
-    </dgm:linClrLst>
-    <dgm:effectClrLst/>
-    <dgm:txLinClrLst/>
-    <dgm:txFillClrLst meth="repeat">
-      <a:schemeClr val="dk1"/>
-    </dgm:txFillClrLst>
-    <dgm:txEffectClrLst/>
-  </dgm:styleLbl>
-  <dgm:styleLbl name="solidFgAcc1">
-    <dgm:fillClrLst meth="repeat">
-      <a:schemeClr val="lt1"/>
-    </dgm:fillClrLst>
-    <dgm:linClrLst meth="repeat">
-      <a:schemeClr val="accent1"/>
-    </dgm:linClrLst>
-    <dgm:effectClrLst/>
-    <dgm:txLinClrLst/>
-    <dgm:txFillClrLst meth="repeat">
-      <a:schemeClr val="dk1"/>
-    </dgm:txFillClrLst>
-    <dgm:txEffectClrLst/>
-  </dgm:styleLbl>
-  <dgm:styleLbl name="solidAlignAcc1">
-    <dgm:fillClrLst meth="repeat">
-      <a:schemeClr val="lt1"/>
-    </dgm:fillClrLst>
-    <dgm:linClrLst meth="repeat">
-      <a:schemeClr val="accent1"/>
-    </dgm:linClrLst>
-    <dgm:effectClrLst/>
-    <dgm:txLinClrLst/>
-    <dgm:txFillClrLst meth="repeat">
-      <a:schemeClr val="dk1"/>
-    </dgm:txFillClrLst>
-    <dgm:txEffectClrLst/>
-  </dgm:styleLbl>
-  <dgm:styleLbl name="solidBgAcc1">
-    <dgm:fillClrLst meth="repeat">
-      <a:schemeClr val="lt1"/>
-    </dgm:fillClrLst>
-    <dgm:linClrLst meth="repeat">
-      <a:schemeClr val="accent1"/>
-    </dgm:linClrLst>
-    <dgm:effectClrLst/>
-    <dgm:txLinClrLst/>
-    <dgm:txFillClrLst meth="repeat">
-      <a:schemeClr val="dk1"/>
-    </dgm:txFillClrLst>
-    <dgm:txEffectClrLst/>
-  </dgm:styleLbl>
-  <dgm:styleLbl name="fgAccFollowNode1">
-    <dgm:fillClrLst meth="repeat">
-      <a:schemeClr val="accent1">
-        <a:alpha val="90000"/>
-        <a:tint val="40000"/>
-      </a:schemeClr>
-    </dgm:fillClrLst>
-    <dgm:linClrLst meth="repeat">
-      <a:schemeClr val="accent1">
-        <a:alpha val="90000"/>
-        <a:tint val="40000"/>
-      </a:schemeClr>
-    </dgm:linClrLst>
-    <dgm:effectClrLst/>
-    <dgm:txLinClrLst/>
-    <dgm:txFillClrLst meth="repeat">
-      <a:schemeClr val="dk1"/>
-    </dgm:txFillClrLst>
-    <dgm:txEffectClrLst/>
-  </dgm:styleLbl>
-  <dgm:styleLbl name="alignAccFollowNode1">
-    <dgm:fillClrLst meth="repeat">
-      <a:schemeClr val="accent1">
-        <a:alpha val="90000"/>
-        <a:tint val="40000"/>
-      </a:schemeClr>
-    </dgm:fillClrLst>
-    <dgm:linClrLst meth="repeat">
-      <a:schemeClr val="accent1">
-        <a:alpha val="90000"/>
-        <a:tint val="40000"/>
-      </a:schemeClr>
-    </dgm:linClrLst>
-    <dgm:effectClrLst/>
-    <dgm:txLinClrLst/>
-    <dgm:txFillClrLst meth="repeat">
-      <a:schemeClr val="dk1"/>
-    </dgm:txFillClrLst>
-    <dgm:txEffectClrLst/>
-  </dgm:styleLbl>
-  <dgm:styleLbl name="bgAccFollowNode1">
-    <dgm:fillClrLst meth="repeat">
-      <a:schemeClr val="accent1">
-        <a:alpha val="90000"/>
-        <a:tint val="40000"/>
-      </a:schemeClr>
-    </dgm:fillClrLst>
-    <dgm:linClrLst meth="repeat">
-      <a:schemeClr val="accent1">
-        <a:alpha val="90000"/>
-        <a:tint val="40000"/>
-      </a:schemeClr>
-    </dgm:linClrLst>
-    <dgm:effectClrLst/>
-    <dgm:txLinClrLst/>
-    <dgm:txFillClrLst meth="repeat">
-      <a:schemeClr val="dk1"/>
-    </dgm:txFillClrLst>
-    <dgm:txEffectClrLst/>
-  </dgm:styleLbl>
-  <dgm:styleLbl name="fgAcc0">
-    <dgm:fillClrLst meth="repeat">
-      <a:schemeClr val="lt1">
-        <a:alpha val="90000"/>
-      </a:schemeClr>
-    </dgm:fillClrLst>
-    <dgm:linClrLst meth="repeat">
-      <a:schemeClr val="accent1"/>
-    </dgm:linClrLst>
-    <dgm:effectClrLst/>
-    <dgm:txLinClrLst/>
-    <dgm:txFillClrLst meth="repeat">
-      <a:schemeClr val="dk1"/>
-    </dgm:txFillClrLst>
-    <dgm:txEffectClrLst/>
-  </dgm:styleLbl>
-  <dgm:styleLbl name="fgAcc2">
-    <dgm:fillClrLst meth="repeat">
-      <a:schemeClr val="lt1">
-        <a:alpha val="90000"/>
-      </a:schemeClr>
-    </dgm:fillClrLst>
-    <dgm:linClrLst meth="repeat">
-      <a:schemeClr val="accent1"/>
-    </dgm:linClrLst>
-    <dgm:effectClrLst/>
-    <dgm:txLinClrLst/>
-    <dgm:txFillClrLst meth="repeat">
-      <a:schemeClr val="dk1"/>
-    </dgm:txFillClrLst>
-    <dgm:txEffectClrLst/>
-  </dgm:styleLbl>
-  <dgm:styleLbl name="fgAcc3">
-    <dgm:fillClrLst meth="repeat">
-      <a:schemeClr val="lt1">
-        <a:alpha val="90000"/>
-      </a:schemeClr>
-    </dgm:fillClrLst>
-    <dgm:linClrLst meth="repeat">
-      <a:schemeClr val="accent1"/>
-    </dgm:linClrLst>
-    <dgm:effectClrLst/>
-    <dgm:txLinClrLst/>
-    <dgm:txFillClrLst meth="repeat">
-      <a:schemeClr val="dk1"/>
-    </dgm:txFillClrLst>
-    <dgm:txEffectClrLst/>
-  </dgm:styleLbl>
-  <dgm:styleLbl name="fgAcc4">
-    <dgm:fillClrLst meth="repeat">
-      <a:schemeClr val="lt1">
-        <a:alpha val="90000"/>
-      </a:schemeClr>
-    </dgm:fillClrLst>
-    <dgm:linClrLst meth="repeat">
-      <a:schemeClr val="accent1"/>
-    </dgm:linClrLst>
-    <dgm:effectClrLst/>
-    <dgm:txLinClrLst/>
-    <dgm:txFillClrLst meth="repeat">
-      <a:schemeClr val="dk1"/>
-    </dgm:txFillClrLst>
-    <dgm:txEffectClrLst/>
-  </dgm:styleLbl>
-  <dgm:styleLbl name="bgShp">
-    <dgm:fillClrLst meth="repeat">
-      <a:schemeClr val="accent1">
-        <a:tint val="40000"/>
-      </a:schemeClr>
-    </dgm:fillClrLst>
-    <dgm:linClrLst meth="repeat">
-      <a:schemeClr val="accent1"/>
-    </dgm:linClrLst>
-    <dgm:effectClrLst/>
-    <dgm:txLinClrLst/>
-    <dgm:txFillClrLst meth="repeat">
-      <a:schemeClr val="dk1"/>
-    </dgm:txFillClrLst>
-    <dgm:txEffectClrLst/>
-  </dgm:styleLbl>
-  <dgm:styleLbl name="dkBgShp">
-    <dgm:fillClrLst meth="repeat">
-      <a:schemeClr val="accent1">
-        <a:shade val="80000"/>
-      </a:schemeClr>
-    </dgm:fillClrLst>
-    <dgm:linClrLst meth="repeat">
-      <a:schemeClr val="accent1"/>
-    </dgm:linClrLst>
-    <dgm:effectClrLst/>
-    <dgm:txLinClrLst/>
-    <dgm:txFillClrLst meth="repeat">
-      <a:schemeClr val="lt1"/>
-    </dgm:txFillClrLst>
-    <dgm:txEffectClrLst/>
-  </dgm:styleLbl>
-  <dgm:styleLbl name="trBgShp">
-    <dgm:fillClrLst meth="repeat">
-      <a:schemeClr val="accent1">
-        <a:tint val="50000"/>
-        <a:alpha val="40000"/>
-      </a:schemeClr>
-    </dgm:fillClrLst>
-    <dgm:linClrLst meth="repeat">
-      <a:schemeClr val="accent1"/>
-    </dgm:linClrLst>
-    <dgm:effectClrLst/>
-    <dgm:txLinClrLst/>
-    <dgm:txFillClrLst meth="repeat">
-      <a:schemeClr val="lt1"/>
-    </dgm:txFillClrLst>
-    <dgm:txEffectClrLst/>
-  </dgm:styleLbl>
-  <dgm:styleLbl name="fgShp">
-    <dgm:fillClrLst meth="repeat">
-      <a:schemeClr val="accent1">
-        <a:tint val="60000"/>
-      </a:schemeClr>
-    </dgm:fillClrLst>
-    <dgm:linClrLst meth="repeat">
-      <a:schemeClr val="lt1"/>
-    </dgm:linClrLst>
-    <dgm:effectClrLst/>
-    <dgm:txLinClrLst/>
-    <dgm:txFillClrLst meth="repeat">
-      <a:schemeClr val="dk1"/>
-    </dgm:txFillClrLst>
-    <dgm:txEffectClrLst/>
-  </dgm:styleLbl>
-  <dgm:styleLbl name="revTx">
-    <dgm:fillClrLst meth="repeat">
-      <a:schemeClr val="lt1">
-        <a:alpha val="0"/>
-      </a:schemeClr>
-    </dgm:fillClrLst>
-    <dgm:linClrLst meth="repeat">
-      <a:schemeClr val="dk1">
-        <a:alpha val="0"/>
-      </a:schemeClr>
-    </dgm:linClrLst>
-    <dgm:effectClrLst/>
-    <dgm:txLinClrLst/>
-    <dgm:txFillClrLst meth="repeat">
-      <a:schemeClr val="tx1"/>
-    </dgm:txFillClrLst>
-    <dgm:txEffectClrLst/>
-  </dgm:styleLbl>
-</dgm:colorsDef>
-</file>
-
-<file path=ppt/diagrams/data1.xml><?xml version="1.0" encoding="utf-8"?>
-<dgm:dataModel xmlns:dgm="http://schemas.openxmlformats.org/drawingml/2006/diagram" xmlns:a="http://schemas.openxmlformats.org/drawingml/2006/main">
-  <dgm:ptLst>
-    <dgm:pt modelId="{0CD1F325-7A2E-924D-9CAB-8AE498583422}" type="doc">
-      <dgm:prSet loTypeId="urn:microsoft.com/office/officeart/2005/8/layout/vList3" loCatId="" qsTypeId="urn:microsoft.com/office/officeart/2005/8/quickstyle/simple4" qsCatId="simple" csTypeId="urn:microsoft.com/office/officeart/2005/8/colors/accent1_2" csCatId="accent1" phldr="1"/>
-      <dgm:spPr/>
-    </dgm:pt>
-    <dgm:pt modelId="{91D04CDE-EFE8-B847-8FC9-DF62369B2AD0}">
-      <dgm:prSet phldrT="[Text]"/>
-      <dgm:spPr/>
-      <dgm:t>
-        <a:bodyPr/>
-        <a:lstStyle/>
-        <a:p>
-          <a:r>
-            <a:rPr lang="en-US" b="1" dirty="0"/>
-            <a:t>D2L</a:t>
-          </a:r>
-        </a:p>
-        <a:p>
-          <a:r>
-            <a:rPr lang="en-US" dirty="0"/>
-            <a:t>Presentations, Grades, Calendar, Announcements, Syllabus</a:t>
-          </a:r>
-        </a:p>
-      </dgm:t>
-    </dgm:pt>
-    <dgm:pt modelId="{B6CF5614-8DA5-3D43-8484-71FFE047FED5}" type="parTrans" cxnId="{3CFB205E-A2C1-5440-8003-DFCF7F4B59B0}">
-      <dgm:prSet/>
-      <dgm:spPr/>
-      <dgm:t>
-        <a:bodyPr/>
-        <a:lstStyle/>
-        <a:p>
-          <a:endParaRPr lang="en-US"/>
-        </a:p>
-      </dgm:t>
-    </dgm:pt>
-    <dgm:pt modelId="{791796F1-C389-114B-8389-5BBA4CCA5E00}" type="sibTrans" cxnId="{3CFB205E-A2C1-5440-8003-DFCF7F4B59B0}">
-      <dgm:prSet/>
-      <dgm:spPr/>
-      <dgm:t>
-        <a:bodyPr/>
-        <a:lstStyle/>
-        <a:p>
-          <a:endParaRPr lang="en-US"/>
-        </a:p>
-      </dgm:t>
-    </dgm:pt>
-    <dgm:pt modelId="{4427C9CC-5B13-A046-83B1-07A8F35B926D}">
-      <dgm:prSet phldrT="[Text]"/>
-      <dgm:spPr/>
-      <dgm:t>
-        <a:bodyPr/>
-        <a:lstStyle/>
-        <a:p>
-          <a:r>
-            <a:rPr lang="en-US" b="1" dirty="0"/>
-            <a:t>GitHub</a:t>
-          </a:r>
-        </a:p>
-        <a:p>
-          <a:r>
-            <a:rPr lang="en-US" dirty="0"/>
-            <a:t>Demos, Team Project Details</a:t>
-          </a:r>
-        </a:p>
-      </dgm:t>
-    </dgm:pt>
-    <dgm:pt modelId="{DFFE4F2F-876F-A643-B850-A92D08D7022D}" type="parTrans" cxnId="{440D4E41-99D7-CE4A-B087-1CB24ED51586}">
-      <dgm:prSet/>
-      <dgm:spPr/>
-      <dgm:t>
-        <a:bodyPr/>
-        <a:lstStyle/>
-        <a:p>
-          <a:endParaRPr lang="en-US"/>
-        </a:p>
-      </dgm:t>
-    </dgm:pt>
-    <dgm:pt modelId="{333F8024-5B67-314A-9232-40F3FE36F8AB}" type="sibTrans" cxnId="{440D4E41-99D7-CE4A-B087-1CB24ED51586}">
-      <dgm:prSet/>
-      <dgm:spPr/>
-      <dgm:t>
-        <a:bodyPr/>
-        <a:lstStyle/>
-        <a:p>
-          <a:endParaRPr lang="en-US"/>
-        </a:p>
-      </dgm:t>
-    </dgm:pt>
-    <dgm:pt modelId="{B761FABC-B7EB-9E40-AF18-2F071788B4EB}" type="pres">
-      <dgm:prSet presAssocID="{0CD1F325-7A2E-924D-9CAB-8AE498583422}" presName="linearFlow" presStyleCnt="0">
-        <dgm:presLayoutVars>
-          <dgm:dir/>
-          <dgm:resizeHandles val="exact"/>
-        </dgm:presLayoutVars>
-      </dgm:prSet>
-      <dgm:spPr/>
-    </dgm:pt>
-    <dgm:pt modelId="{1D2E6F4F-6A7B-C94B-88CF-894903A92F6C}" type="pres">
-      <dgm:prSet presAssocID="{91D04CDE-EFE8-B847-8FC9-DF62369B2AD0}" presName="composite" presStyleCnt="0"/>
-      <dgm:spPr/>
-    </dgm:pt>
-    <dgm:pt modelId="{1798338C-01D7-7D43-B9C1-F3463531AE10}" type="pres">
-      <dgm:prSet presAssocID="{91D04CDE-EFE8-B847-8FC9-DF62369B2AD0}" presName="imgShp" presStyleLbl="fgImgPlace1" presStyleIdx="0" presStyleCnt="2"/>
-      <dgm:spPr/>
-    </dgm:pt>
-    <dgm:pt modelId="{224A842F-6C57-9C43-B4F5-2D0999E1C2D4}" type="pres">
-      <dgm:prSet presAssocID="{91D04CDE-EFE8-B847-8FC9-DF62369B2AD0}" presName="txShp" presStyleLbl="node1" presStyleIdx="0" presStyleCnt="2">
-        <dgm:presLayoutVars>
-          <dgm:bulletEnabled val="1"/>
-        </dgm:presLayoutVars>
-      </dgm:prSet>
-      <dgm:spPr/>
-    </dgm:pt>
-    <dgm:pt modelId="{0BFAAD3C-305E-B741-9BC5-4E7970405286}" type="pres">
-      <dgm:prSet presAssocID="{791796F1-C389-114B-8389-5BBA4CCA5E00}" presName="spacing" presStyleCnt="0"/>
-      <dgm:spPr/>
-    </dgm:pt>
-    <dgm:pt modelId="{3133C186-81B4-524C-8AD5-097D92D87596}" type="pres">
-      <dgm:prSet presAssocID="{4427C9CC-5B13-A046-83B1-07A8F35B926D}" presName="composite" presStyleCnt="0"/>
-      <dgm:spPr/>
-    </dgm:pt>
-    <dgm:pt modelId="{AC588B44-0BBD-1A41-91F7-E9A6B4D7544A}" type="pres">
-      <dgm:prSet presAssocID="{4427C9CC-5B13-A046-83B1-07A8F35B926D}" presName="imgShp" presStyleLbl="fgImgPlace1" presStyleIdx="1" presStyleCnt="2"/>
-      <dgm:spPr/>
-    </dgm:pt>
-    <dgm:pt modelId="{2CD1C840-36E5-B349-887F-61A7A6D3ECFF}" type="pres">
-      <dgm:prSet presAssocID="{4427C9CC-5B13-A046-83B1-07A8F35B926D}" presName="txShp" presStyleLbl="node1" presStyleIdx="1" presStyleCnt="2">
-        <dgm:presLayoutVars>
-          <dgm:bulletEnabled val="1"/>
-        </dgm:presLayoutVars>
-      </dgm:prSet>
-      <dgm:spPr/>
-    </dgm:pt>
-  </dgm:ptLst>
-  <dgm:cxnLst>
-    <dgm:cxn modelId="{3156321E-9E7F-3B4B-AF99-4FDD9AA0C961}" type="presOf" srcId="{4427C9CC-5B13-A046-83B1-07A8F35B926D}" destId="{2CD1C840-36E5-B349-887F-61A7A6D3ECFF}" srcOrd="0" destOrd="0" presId="urn:microsoft.com/office/officeart/2005/8/layout/vList3"/>
-    <dgm:cxn modelId="{440D4E41-99D7-CE4A-B087-1CB24ED51586}" srcId="{0CD1F325-7A2E-924D-9CAB-8AE498583422}" destId="{4427C9CC-5B13-A046-83B1-07A8F35B926D}" srcOrd="1" destOrd="0" parTransId="{DFFE4F2F-876F-A643-B850-A92D08D7022D}" sibTransId="{333F8024-5B67-314A-9232-40F3FE36F8AB}"/>
-    <dgm:cxn modelId="{3CFB205E-A2C1-5440-8003-DFCF7F4B59B0}" srcId="{0CD1F325-7A2E-924D-9CAB-8AE498583422}" destId="{91D04CDE-EFE8-B847-8FC9-DF62369B2AD0}" srcOrd="0" destOrd="0" parTransId="{B6CF5614-8DA5-3D43-8484-71FFE047FED5}" sibTransId="{791796F1-C389-114B-8389-5BBA4CCA5E00}"/>
-    <dgm:cxn modelId="{49161D63-85F8-2448-A222-FCDAE6F0AC50}" type="presOf" srcId="{0CD1F325-7A2E-924D-9CAB-8AE498583422}" destId="{B761FABC-B7EB-9E40-AF18-2F071788B4EB}" srcOrd="0" destOrd="0" presId="urn:microsoft.com/office/officeart/2005/8/layout/vList3"/>
-    <dgm:cxn modelId="{A27355A3-0776-754C-8261-898091854033}" type="presOf" srcId="{91D04CDE-EFE8-B847-8FC9-DF62369B2AD0}" destId="{224A842F-6C57-9C43-B4F5-2D0999E1C2D4}" srcOrd="0" destOrd="0" presId="urn:microsoft.com/office/officeart/2005/8/layout/vList3"/>
-    <dgm:cxn modelId="{1CEBED47-CC6F-7D4F-ABF0-6B04D5CAC3D9}" type="presParOf" srcId="{B761FABC-B7EB-9E40-AF18-2F071788B4EB}" destId="{1D2E6F4F-6A7B-C94B-88CF-894903A92F6C}" srcOrd="0" destOrd="0" presId="urn:microsoft.com/office/officeart/2005/8/layout/vList3"/>
-    <dgm:cxn modelId="{02871E0F-E1DF-6047-B78A-FB1BBB51D94C}" type="presParOf" srcId="{1D2E6F4F-6A7B-C94B-88CF-894903A92F6C}" destId="{1798338C-01D7-7D43-B9C1-F3463531AE10}" srcOrd="0" destOrd="0" presId="urn:microsoft.com/office/officeart/2005/8/layout/vList3"/>
-    <dgm:cxn modelId="{1F566E1D-A3AC-AB44-BA0B-3678B99E37BE}" type="presParOf" srcId="{1D2E6F4F-6A7B-C94B-88CF-894903A92F6C}" destId="{224A842F-6C57-9C43-B4F5-2D0999E1C2D4}" srcOrd="1" destOrd="0" presId="urn:microsoft.com/office/officeart/2005/8/layout/vList3"/>
-    <dgm:cxn modelId="{47B3C634-227B-F443-BAF1-F2756E75D63F}" type="presParOf" srcId="{B761FABC-B7EB-9E40-AF18-2F071788B4EB}" destId="{0BFAAD3C-305E-B741-9BC5-4E7970405286}" srcOrd="1" destOrd="0" presId="urn:microsoft.com/office/officeart/2005/8/layout/vList3"/>
-    <dgm:cxn modelId="{26184242-17CA-DA48-8232-758187EA1A24}" type="presParOf" srcId="{B761FABC-B7EB-9E40-AF18-2F071788B4EB}" destId="{3133C186-81B4-524C-8AD5-097D92D87596}" srcOrd="2" destOrd="0" presId="urn:microsoft.com/office/officeart/2005/8/layout/vList3"/>
-    <dgm:cxn modelId="{95642507-5688-7E49-8880-B0F86A378159}" type="presParOf" srcId="{3133C186-81B4-524C-8AD5-097D92D87596}" destId="{AC588B44-0BBD-1A41-91F7-E9A6B4D7544A}" srcOrd="0" destOrd="0" presId="urn:microsoft.com/office/officeart/2005/8/layout/vList3"/>
-    <dgm:cxn modelId="{103BBC70-29AA-CE48-B7C2-EC45FBB0CFE1}" type="presParOf" srcId="{3133C186-81B4-524C-8AD5-097D92D87596}" destId="{2CD1C840-36E5-B349-887F-61A7A6D3ECFF}" srcOrd="1" destOrd="0" presId="urn:microsoft.com/office/officeart/2005/8/layout/vList3"/>
-  </dgm:cxnLst>
-  <dgm:bg/>
-  <dgm:whole/>
-  <dgm:extLst>
-    <a:ext uri="http://schemas.microsoft.com/office/drawing/2008/diagram">
-      <dsp:dataModelExt xmlns:dsp="http://schemas.microsoft.com/office/drawing/2008/diagram" relId="rId6" minVer="http://schemas.openxmlformats.org/drawingml/2006/diagram"/>
-    </a:ext>
-  </dgm:extLst>
-</dgm:dataModel>
-</file>
-
-<file path=ppt/diagrams/drawing1.xml><?xml version="1.0" encoding="utf-8"?>
-<dsp:drawing xmlns:dgm="http://schemas.openxmlformats.org/drawingml/2006/diagram" xmlns:dsp="http://schemas.microsoft.com/office/drawing/2008/diagram" xmlns:a="http://schemas.openxmlformats.org/drawingml/2006/main">
-  <dsp:spTree>
-    <dsp:nvGrpSpPr>
-      <dsp:cNvPr id="0" name=""/>
-      <dsp:cNvGrpSpPr/>
-    </dsp:nvGrpSpPr>
-    <dsp:grpSpPr/>
-    <dsp:sp modelId="{224A842F-6C57-9C43-B4F5-2D0999E1C2D4}">
-      <dsp:nvSpPr>
-        <dsp:cNvPr id="0" name=""/>
-        <dsp:cNvSpPr/>
-      </dsp:nvSpPr>
-      <dsp:spPr>
-        <a:xfrm rot="10800000">
-          <a:off x="2234385" y="1178"/>
-          <a:ext cx="6992874" cy="1892089"/>
-        </a:xfrm>
-        <a:prstGeom prst="homePlate">
-          <a:avLst/>
-        </a:prstGeom>
-        <a:gradFill rotWithShape="0">
-          <a:gsLst>
-            <a:gs pos="0">
-              <a:schemeClr val="accent1">
-                <a:hueOff val="0"/>
-                <a:satOff val="0"/>
-                <a:lumOff val="0"/>
-                <a:alphaOff val="0"/>
-                <a:satMod val="103000"/>
-                <a:lumMod val="102000"/>
-                <a:tint val="94000"/>
-              </a:schemeClr>
-            </a:gs>
-            <a:gs pos="50000">
-              <a:schemeClr val="accent1">
-                <a:hueOff val="0"/>
-                <a:satOff val="0"/>
-                <a:lumOff val="0"/>
-                <a:alphaOff val="0"/>
-                <a:satMod val="110000"/>
-                <a:lumMod val="100000"/>
-                <a:shade val="100000"/>
-              </a:schemeClr>
-            </a:gs>
-            <a:gs pos="100000">
-              <a:schemeClr val="accent1">
-                <a:hueOff val="0"/>
-                <a:satOff val="0"/>
-                <a:lumOff val="0"/>
-                <a:alphaOff val="0"/>
-                <a:lumMod val="99000"/>
-                <a:satMod val="120000"/>
-                <a:shade val="78000"/>
-              </a:schemeClr>
-            </a:gs>
-          </a:gsLst>
-          <a:lin ang="5400000" scaled="0"/>
-        </a:gradFill>
-        <a:ln>
-          <a:noFill/>
-        </a:ln>
-        <a:effectLst/>
-      </dsp:spPr>
-      <dsp:style>
-        <a:lnRef idx="0">
-          <a:scrgbClr r="0" g="0" b="0"/>
-        </a:lnRef>
-        <a:fillRef idx="3">
-          <a:scrgbClr r="0" g="0" b="0"/>
-        </a:fillRef>
-        <a:effectRef idx="2">
-          <a:scrgbClr r="0" g="0" b="0"/>
-        </a:effectRef>
-        <a:fontRef idx="minor">
-          <a:schemeClr val="lt1"/>
-        </a:fontRef>
-      </dsp:style>
-      <dsp:txBody>
-        <a:bodyPr spcFirstLastPara="0" vert="horz" wrap="square" lIns="834359" tIns="114300" rIns="213360" bIns="114300" numCol="1" spcCol="1270" anchor="ctr" anchorCtr="0">
-          <a:noAutofit/>
-        </a:bodyPr>
-        <a:lstStyle/>
-        <a:p>
-          <a:pPr marL="0" lvl="0" indent="0" algn="ctr" defTabSz="1333500">
-            <a:lnSpc>
-              <a:spcPct val="90000"/>
-            </a:lnSpc>
-            <a:spcBef>
-              <a:spcPct val="0"/>
-            </a:spcBef>
-            <a:spcAft>
-              <a:spcPct val="35000"/>
-            </a:spcAft>
-            <a:buNone/>
-          </a:pPr>
-          <a:r>
-            <a:rPr lang="en-US" sz="3000" b="1" kern="1200" dirty="0"/>
-            <a:t>D2L</a:t>
-          </a:r>
-        </a:p>
-        <a:p>
-          <a:pPr marL="0" lvl="0" indent="0" algn="ctr" defTabSz="1333500">
-            <a:lnSpc>
-              <a:spcPct val="90000"/>
-            </a:lnSpc>
-            <a:spcBef>
-              <a:spcPct val="0"/>
-            </a:spcBef>
-            <a:spcAft>
-              <a:spcPct val="35000"/>
-            </a:spcAft>
-            <a:buNone/>
-          </a:pPr>
-          <a:r>
-            <a:rPr lang="en-US" sz="3000" kern="1200" dirty="0"/>
-            <a:t>Presentations, Grades, Calendar, Announcements, Syllabus</a:t>
-          </a:r>
-        </a:p>
-      </dsp:txBody>
-      <dsp:txXfrm rot="10800000">
-        <a:off x="2707407" y="1178"/>
-        <a:ext cx="6519852" cy="1892089"/>
-      </dsp:txXfrm>
-    </dsp:sp>
-    <dsp:sp modelId="{1798338C-01D7-7D43-B9C1-F3463531AE10}">
-      <dsp:nvSpPr>
-        <dsp:cNvPr id="0" name=""/>
-        <dsp:cNvSpPr/>
-      </dsp:nvSpPr>
-      <dsp:spPr>
-        <a:xfrm>
-          <a:off x="1288340" y="1178"/>
-          <a:ext cx="1892089" cy="1892089"/>
-        </a:xfrm>
-        <a:prstGeom prst="ellipse">
-          <a:avLst/>
-        </a:prstGeom>
-        <a:solidFill>
-          <a:schemeClr val="accent1">
-            <a:tint val="50000"/>
-            <a:hueOff val="0"/>
-            <a:satOff val="0"/>
-            <a:lumOff val="0"/>
-            <a:alphaOff val="0"/>
-          </a:schemeClr>
-        </a:solidFill>
-        <a:ln>
-          <a:noFill/>
-        </a:ln>
-        <a:effectLst/>
-      </dsp:spPr>
-      <dsp:style>
-        <a:lnRef idx="0">
-          <a:scrgbClr r="0" g="0" b="0"/>
-        </a:lnRef>
-        <a:fillRef idx="1">
-          <a:scrgbClr r="0" g="0" b="0"/>
-        </a:fillRef>
-        <a:effectRef idx="2">
-          <a:scrgbClr r="0" g="0" b="0"/>
-        </a:effectRef>
-        <a:fontRef idx="minor"/>
-      </dsp:style>
-    </dsp:sp>
-    <dsp:sp modelId="{2CD1C840-36E5-B349-887F-61A7A6D3ECFF}">
-      <dsp:nvSpPr>
-        <dsp:cNvPr id="0" name=""/>
-        <dsp:cNvSpPr/>
-      </dsp:nvSpPr>
-      <dsp:spPr>
-        <a:xfrm rot="10800000">
-          <a:off x="2234385" y="2458070"/>
-          <a:ext cx="6992874" cy="1892089"/>
-        </a:xfrm>
-        <a:prstGeom prst="homePlate">
-          <a:avLst/>
-        </a:prstGeom>
-        <a:gradFill rotWithShape="0">
-          <a:gsLst>
-            <a:gs pos="0">
-              <a:schemeClr val="accent1">
-                <a:hueOff val="0"/>
-                <a:satOff val="0"/>
-                <a:lumOff val="0"/>
-                <a:alphaOff val="0"/>
-                <a:satMod val="103000"/>
-                <a:lumMod val="102000"/>
-                <a:tint val="94000"/>
-              </a:schemeClr>
-            </a:gs>
-            <a:gs pos="50000">
-              <a:schemeClr val="accent1">
-                <a:hueOff val="0"/>
-                <a:satOff val="0"/>
-                <a:lumOff val="0"/>
-                <a:alphaOff val="0"/>
-                <a:satMod val="110000"/>
-                <a:lumMod val="100000"/>
-                <a:shade val="100000"/>
-              </a:schemeClr>
-            </a:gs>
-            <a:gs pos="100000">
-              <a:schemeClr val="accent1">
-                <a:hueOff val="0"/>
-                <a:satOff val="0"/>
-                <a:lumOff val="0"/>
-                <a:alphaOff val="0"/>
-                <a:lumMod val="99000"/>
-                <a:satMod val="120000"/>
-                <a:shade val="78000"/>
-              </a:schemeClr>
-            </a:gs>
-          </a:gsLst>
-          <a:lin ang="5400000" scaled="0"/>
-        </a:gradFill>
-        <a:ln>
-          <a:noFill/>
-        </a:ln>
-        <a:effectLst/>
-      </dsp:spPr>
-      <dsp:style>
-        <a:lnRef idx="0">
-          <a:scrgbClr r="0" g="0" b="0"/>
-        </a:lnRef>
-        <a:fillRef idx="3">
-          <a:scrgbClr r="0" g="0" b="0"/>
-        </a:fillRef>
-        <a:effectRef idx="2">
-          <a:scrgbClr r="0" g="0" b="0"/>
-        </a:effectRef>
-        <a:fontRef idx="minor">
-          <a:schemeClr val="lt1"/>
-        </a:fontRef>
-      </dsp:style>
-      <dsp:txBody>
-        <a:bodyPr spcFirstLastPara="0" vert="horz" wrap="square" lIns="834359" tIns="114300" rIns="213360" bIns="114300" numCol="1" spcCol="1270" anchor="ctr" anchorCtr="0">
-          <a:noAutofit/>
-        </a:bodyPr>
-        <a:lstStyle/>
-        <a:p>
-          <a:pPr marL="0" lvl="0" indent="0" algn="ctr" defTabSz="1333500">
-            <a:lnSpc>
-              <a:spcPct val="90000"/>
-            </a:lnSpc>
-            <a:spcBef>
-              <a:spcPct val="0"/>
-            </a:spcBef>
-            <a:spcAft>
-              <a:spcPct val="35000"/>
-            </a:spcAft>
-            <a:buNone/>
-          </a:pPr>
-          <a:r>
-            <a:rPr lang="en-US" sz="3000" b="1" kern="1200" dirty="0"/>
-            <a:t>GitHub</a:t>
-          </a:r>
-        </a:p>
-        <a:p>
-          <a:pPr marL="0" lvl="0" indent="0" algn="ctr" defTabSz="1333500">
-            <a:lnSpc>
-              <a:spcPct val="90000"/>
-            </a:lnSpc>
-            <a:spcBef>
-              <a:spcPct val="0"/>
-            </a:spcBef>
-            <a:spcAft>
-              <a:spcPct val="35000"/>
-            </a:spcAft>
-            <a:buNone/>
-          </a:pPr>
-          <a:r>
-            <a:rPr lang="en-US" sz="3000" kern="1200" dirty="0"/>
-            <a:t>Demos, Team Project Details</a:t>
-          </a:r>
-        </a:p>
-      </dsp:txBody>
-      <dsp:txXfrm rot="10800000">
-        <a:off x="2707407" y="2458070"/>
-        <a:ext cx="6519852" cy="1892089"/>
-      </dsp:txXfrm>
-    </dsp:sp>
-    <dsp:sp modelId="{AC588B44-0BBD-1A41-91F7-E9A6B4D7544A}">
-      <dsp:nvSpPr>
-        <dsp:cNvPr id="0" name=""/>
-        <dsp:cNvSpPr/>
-      </dsp:nvSpPr>
-      <dsp:spPr>
-        <a:xfrm>
-          <a:off x="1288340" y="2458070"/>
-          <a:ext cx="1892089" cy="1892089"/>
-        </a:xfrm>
-        <a:prstGeom prst="ellipse">
-          <a:avLst/>
-        </a:prstGeom>
-        <a:solidFill>
-          <a:schemeClr val="accent1">
-            <a:tint val="50000"/>
-            <a:hueOff val="0"/>
-            <a:satOff val="0"/>
-            <a:lumOff val="0"/>
-            <a:alphaOff val="0"/>
-          </a:schemeClr>
-        </a:solidFill>
-        <a:ln>
-          <a:noFill/>
-        </a:ln>
-        <a:effectLst/>
-      </dsp:spPr>
-      <dsp:style>
-        <a:lnRef idx="0">
-          <a:scrgbClr r="0" g="0" b="0"/>
-        </a:lnRef>
-        <a:fillRef idx="1">
-          <a:scrgbClr r="0" g="0" b="0"/>
-        </a:fillRef>
-        <a:effectRef idx="2">
-          <a:scrgbClr r="0" g="0" b="0"/>
-        </a:effectRef>
-        <a:fontRef idx="minor"/>
-      </dsp:style>
-    </dsp:sp>
-  </dsp:spTree>
-</dsp:drawing>
-</file>
-
-<file path=ppt/diagrams/layout1.xml><?xml version="1.0" encoding="utf-8"?>
-<dgm:layoutDef xmlns:dgm="http://schemas.openxmlformats.org/drawingml/2006/diagram" xmlns:a="http://schemas.openxmlformats.org/drawingml/2006/main" uniqueId="urn:microsoft.com/office/officeart/2005/8/layout/vList3">
-  <dgm:title val=""/>
-  <dgm:desc val=""/>
-  <dgm:catLst>
-    <dgm:cat type="list" pri="14000"/>
-    <dgm:cat type="convert" pri="3000"/>
-    <dgm:cat type="picture" pri="27000"/>
-    <dgm:cat type="pictureconvert" pri="27000"/>
-  </dgm:catLst>
-  <dgm:sampData useDef="1">
-    <dgm:dataModel>
-      <dgm:ptLst/>
-      <dgm:bg/>
-      <dgm:whole/>
-    </dgm:dataModel>
-  </dgm:sampData>
-  <dgm:styleData>
-    <dgm:dataModel>
-      <dgm:ptLst>
-        <dgm:pt modelId="0" type="doc"/>
-        <dgm:pt modelId="1"/>
-        <dgm:pt modelId="2"/>
-      </dgm:ptLst>
-      <dgm:cxnLst>
-        <dgm:cxn modelId="3" srcId="0" destId="1" srcOrd="0" destOrd="0"/>
-        <dgm:cxn modelId="4" srcId="0" destId="2" srcOrd="1" destOrd="0"/>
-      </dgm:cxnLst>
-      <dgm:bg/>
-      <dgm:whole/>
-    </dgm:dataModel>
-  </dgm:styleData>
-  <dgm:clrData>
-    <dgm:dataModel>
-      <dgm:ptLst>
-        <dgm:pt modelId="0" type="doc"/>
-        <dgm:pt modelId="1"/>
-        <dgm:pt modelId="2"/>
-        <dgm:pt modelId="3"/>
-        <dgm:pt modelId="4"/>
-      </dgm:ptLst>
-      <dgm:cxnLst>
-        <dgm:cxn modelId="5" srcId="0" destId="1" srcOrd="0" destOrd="0"/>
-        <dgm:cxn modelId="6" srcId="0" destId="2" srcOrd="1" destOrd="0"/>
-        <dgm:cxn modelId="7" srcId="0" destId="3" srcOrd="2" destOrd="0"/>
-        <dgm:cxn modelId="8" srcId="0" destId="4" srcOrd="3" destOrd="0"/>
-      </dgm:cxnLst>
-      <dgm:bg/>
-      <dgm:whole/>
-    </dgm:dataModel>
-  </dgm:clrData>
-  <dgm:layoutNode name="linearFlow">
-    <dgm:varLst>
-      <dgm:dir/>
-      <dgm:resizeHandles val="exact"/>
-    </dgm:varLst>
-    <dgm:alg type="lin">
-      <dgm:param type="linDir" val="fromT"/>
-      <dgm:param type="vertAlign" val="mid"/>
-      <dgm:param type="horzAlign" val="ctr"/>
-    </dgm:alg>
-    <dgm:shape xmlns:r="http://schemas.openxmlformats.org/officeDocument/2006/relationships" r:blip="">
-      <dgm:adjLst/>
-    </dgm:shape>
-    <dgm:presOf/>
-    <dgm:constrLst>
-      <dgm:constr type="w" for="ch" forName="composite" refType="w"/>
-      <dgm:constr type="h" for="ch" forName="composite" refType="h"/>
-      <dgm:constr type="h" for="ch" forName="spacing" refType="h" refFor="ch" refForName="composite" fact="0.25"/>
-      <dgm:constr type="h" for="ch" forName="spacing" refType="w" op="lte" fact="0.1"/>
-      <dgm:constr type="primFontSz" for="des" ptType="node" op="equ" val="65"/>
-    </dgm:constrLst>
-    <dgm:ruleLst/>
-    <dgm:forEach name="Name0" axis="ch" ptType="node">
-      <dgm:layoutNode name="composite">
-        <dgm:alg type="composite"/>
-        <dgm:shape xmlns:r="http://schemas.openxmlformats.org/officeDocument/2006/relationships" r:blip="">
-          <dgm:adjLst/>
-        </dgm:shape>
-        <dgm:presOf/>
-        <dgm:choose name="Name1">
-          <dgm:if name="Name2" func="var" arg="dir" op="equ" val="norm">
-            <dgm:constrLst>
-              <dgm:constr type="w" for="ch" forName="imgShp" refType="w" fact="0.335"/>
-              <dgm:constr type="h" for="ch" forName="imgShp" refType="w" refFor="ch" refForName="imgShp" op="equ"/>
-              <dgm:constr type="h" for="ch" forName="imgShp" refType="h" op="lte"/>
-              <dgm:constr type="ctrY" for="ch" forName="imgShp" refType="h" fact="0.5"/>
-              <dgm:constr type="l" for="ch" forName="imgShp"/>
-              <dgm:constr type="w" for="ch" forName="txShp" refType="w" op="equ" fact="0.665"/>
-              <dgm:constr type="h" for="ch" forName="txShp" refType="h" refFor="ch" refForName="imgShp" op="equ"/>
-              <dgm:constr type="ctrY" for="ch" forName="txShp" refType="h" fact="0.5"/>
-              <dgm:constr type="l" for="ch" forName="txShp" refType="w" refFor="ch" refForName="imgShp" fact="0.5"/>
-              <dgm:constr type="lMarg" for="ch" forName="txShp" refType="w" refFor="ch" refForName="imgShp" fact="1.25"/>
-            </dgm:constrLst>
-          </dgm:if>
-          <dgm:else name="Name3">
-            <dgm:constrLst>
-              <dgm:constr type="w" for="ch" forName="imgShp" refType="w" fact="0.335"/>
-              <dgm:constr type="h" for="ch" forName="imgShp" refType="w" refFor="ch" refForName="imgShp" op="equ"/>
-              <dgm:constr type="h" for="ch" forName="imgShp" refType="h" op="lte"/>
-              <dgm:constr type="ctrY" for="ch" forName="imgShp" refType="h" fact="0.5"/>
-              <dgm:constr type="r" for="ch" forName="imgShp" refType="w"/>
-              <dgm:constr type="w" for="ch" forName="txShp" refType="w" op="equ" fact="0.665"/>
-              <dgm:constr type="h" for="ch" forName="txShp" refType="h" refFor="ch" refForName="imgShp" op="equ"/>
-              <dgm:constr type="ctrY" for="ch" forName="txShp" refType="h" fact="0.5"/>
-              <dgm:constr type="r" for="ch" forName="txShp" refType="ctrX" refFor="ch" refForName="imgShp"/>
-              <dgm:constr type="rMarg" for="ch" forName="txShp" refType="w" refFor="ch" refForName="imgShp" fact="1.25"/>
-            </dgm:constrLst>
-          </dgm:else>
-        </dgm:choose>
-        <dgm:ruleLst/>
-        <dgm:layoutNode name="imgShp" styleLbl="fgImgPlace1">
-          <dgm:alg type="sp"/>
-          <dgm:shape xmlns:r="http://schemas.openxmlformats.org/officeDocument/2006/relationships" type="ellipse" r:blip="" blipPhldr="1">
-            <dgm:adjLst/>
-          </dgm:shape>
-          <dgm:presOf/>
-          <dgm:constrLst/>
-          <dgm:ruleLst/>
-        </dgm:layoutNode>
-        <dgm:layoutNode name="txShp">
-          <dgm:varLst>
-            <dgm:bulletEnabled val="1"/>
-          </dgm:varLst>
-          <dgm:alg type="tx"/>
-          <dgm:choose name="Name4">
-            <dgm:if name="Name5" func="var" arg="dir" op="equ" val="norm">
-              <dgm:shape xmlns:r="http://schemas.openxmlformats.org/officeDocument/2006/relationships" rot="180" type="homePlate" r:blip="" zOrderOff="-1">
-                <dgm:adjLst/>
-              </dgm:shape>
-            </dgm:if>
-            <dgm:else name="Name6">
-              <dgm:shape xmlns:r="http://schemas.openxmlformats.org/officeDocument/2006/relationships" type="homePlate" r:blip="" zOrderOff="-1">
-                <dgm:adjLst/>
-              </dgm:shape>
-            </dgm:else>
-          </dgm:choose>
-          <dgm:presOf axis="desOrSelf" ptType="node"/>
-          <dgm:constrLst>
-            <dgm:constr type="tMarg" refType="primFontSz" fact="0.3"/>
-            <dgm:constr type="bMarg" refType="primFontSz" fact="0.3"/>
-          </dgm:constrLst>
-          <dgm:ruleLst>
-            <dgm:rule type="primFontSz" val="5" fact="NaN" max="NaN"/>
-          </dgm:ruleLst>
-        </dgm:layoutNode>
-      </dgm:layoutNode>
-      <dgm:forEach name="Name7" axis="followSib" ptType="sibTrans" cnt="1">
-        <dgm:layoutNode name="spacing">
-          <dgm:alg type="sp"/>
-          <dgm:shape xmlns:r="http://schemas.openxmlformats.org/officeDocument/2006/relationships" r:blip="">
-            <dgm:adjLst/>
-          </dgm:shape>
-          <dgm:presOf axis="self"/>
-          <dgm:constrLst/>
-          <dgm:ruleLst/>
-        </dgm:layoutNode>
-      </dgm:forEach>
-    </dgm:forEach>
-  </dgm:layoutNode>
-</dgm:layoutDef>
-</file>
-
-<file path=ppt/diagrams/quickStyle1.xml><?xml version="1.0" encoding="utf-8"?>
-<dgm:styleDef xmlns:dgm="http://schemas.openxmlformats.org/drawingml/2006/diagram" xmlns:a="http://schemas.openxmlformats.org/drawingml/2006/main" uniqueId="urn:microsoft.com/office/officeart/2005/8/quickstyle/simple4">
-  <dgm:title val=""/>
-  <dgm:desc val=""/>
-  <dgm:catLst>
-    <dgm:cat type="simple" pri="10400"/>
-  </dgm:catLst>
-  <dgm:scene3d>
-    <a:camera prst="orthographicFront"/>
-    <a:lightRig rig="threePt" dir="t"/>
-  </dgm:scene3d>
-  <dgm:styleLbl name="node0">
-    <dgm:scene3d>
-      <a:camera prst="orthographicFront"/>
-      <a:lightRig rig="threePt" dir="t"/>
-    </dgm:scene3d>
-    <dgm:sp3d/>
-    <dgm:txPr/>
-    <dgm:style>
-      <a:lnRef idx="0">
-        <a:scrgbClr r="0" g="0" b="0"/>
-      </a:lnRef>
-      <a:fillRef idx="3">
-        <a:scrgbClr r="0" g="0" b="0"/>
-      </a:fillRef>
-      <a:effectRef idx="2">
-        <a:scrgbClr r="0" g="0" b="0"/>
-      </a:effectRef>
-      <a:fontRef idx="minor">
-        <a:schemeClr val="lt1"/>
-      </a:fontRef>
-    </dgm:style>
-  </dgm:styleLbl>
-  <dgm:styleLbl name="lnNode1">
-    <dgm:scene3d>
-      <a:camera prst="orthographicFront"/>
-      <a:lightRig rig="threePt" dir="t"/>
-    </dgm:scene3d>
-    <dgm:sp3d/>
-    <dgm:txPr/>
-    <dgm:style>
-      <a:lnRef idx="1">
-        <a:scrgbClr r="0" g="0" b="0"/>
-      </a:lnRef>
-      <a:fillRef idx="3">
-        <a:scrgbClr r="0" g="0" b="0"/>
-      </a:fillRef>
-      <a:effectRef idx="2">
-        <a:scrgbClr r="0" g="0" b="0"/>
-      </a:effectRef>
-      <a:fontRef idx="minor">
-        <a:schemeClr val="lt1"/>
-      </a:fontRef>
-    </dgm:style>
-  </dgm:styleLbl>
-  <dgm:styleLbl name="vennNode1">
-    <dgm:scene3d>
-      <a:camera prst="orthographicFront"/>
-      <a:lightRig rig="threePt" dir="t"/>
-    </dgm:scene3d>
-    <dgm:sp3d/>
-    <dgm:txPr/>
-    <dgm:style>
-      <a:lnRef idx="0">
-        <a:scrgbClr r="0" g="0" b="0"/>
-      </a:lnRef>
-      <a:fillRef idx="3">
-        <a:scrgbClr r="0" g="0" b="0"/>
-      </a:fillRef>
-      <a:effectRef idx="0">
-        <a:scrgbClr r="0" g="0" b="0"/>
-      </a:effectRef>
-      <a:fontRef idx="minor">
-        <a:schemeClr val="tx1"/>
-      </a:fontRef>
-    </dgm:style>
-  </dgm:styleLbl>
-  <dgm:styleLbl name="alignNode1">
-    <dgm:scene3d>
-      <a:camera prst="orthographicFront"/>
-      <a:lightRig rig="threePt" dir="t"/>
-    </dgm:scene3d>
-    <dgm:sp3d/>
-    <dgm:txPr/>
-    <dgm:style>
-      <a:lnRef idx="1">
-        <a:scrgbClr r="0" g="0" b="0"/>
-      </a:lnRef>
-      <a:fillRef idx="3">
-        <a:scrgbClr r="0" g="0" b="0"/>
-      </a:fillRef>
-      <a:effectRef idx="2">
-        <a:scrgbClr r="0" g="0" b="0"/>
-      </a:effectRef>
-      <a:fontRef idx="minor">
-        <a:schemeClr val="lt1"/>
-      </a:fontRef>
-    </dgm:style>
-  </dgm:styleLbl>
-  <dgm:styleLbl name="node1">
-    <dgm:scene3d>
-      <a:camera prst="orthographicFront"/>
-      <a:lightRig rig="threePt" dir="t"/>
-    </dgm:scene3d>
-    <dgm:sp3d/>
-    <dgm:txPr/>
-    <dgm:style>
-      <a:lnRef idx="0">
-        <a:scrgbClr r="0" g="0" b="0"/>
-      </a:lnRef>
-      <a:fillRef idx="3">
-        <a:scrgbClr r="0" g="0" b="0"/>
-      </a:fillRef>
-      <a:effectRef idx="2">
-        <a:scrgbClr r="0" g="0" b="0"/>
-      </a:effectRef>
-      <a:fontRef idx="minor">
-        <a:schemeClr val="lt1"/>
-      </a:fontRef>
-    </dgm:style>
-  </dgm:styleLbl>
-  <dgm:styleLbl name="node2">
-    <dgm:scene3d>
-      <a:camera prst="orthographicFront"/>
-      <a:lightRig rig="threePt" dir="t"/>
-    </dgm:scene3d>
-    <dgm:sp3d/>
-    <dgm:txPr/>
-    <dgm:style>
-      <a:lnRef idx="0">
-        <a:scrgbClr r="0" g="0" b="0"/>
-      </a:lnRef>
-      <a:fillRef idx="3">
-        <a:scrgbClr r="0" g="0" b="0"/>
-      </a:fillRef>
-      <a:effectRef idx="2">
-        <a:scrgbClr r="0" g="0" b="0"/>
-      </a:effectRef>
-      <a:fontRef idx="minor">
-        <a:schemeClr val="lt1"/>
-      </a:fontRef>
-    </dgm:style>
-  </dgm:styleLbl>
-  <dgm:styleLbl name="node3">
-    <dgm:scene3d>
-      <a:camera prst="orthographicFront"/>
-      <a:lightRig rig="threePt" dir="t"/>
-    </dgm:scene3d>
-    <dgm:sp3d/>
-    <dgm:txPr/>
-    <dgm:style>
-      <a:lnRef idx="0">
-        <a:scrgbClr r="0" g="0" b="0"/>
-      </a:lnRef>
-      <a:fillRef idx="3">
-        <a:scrgbClr r="0" g="0" b="0"/>
-      </a:fillRef>
-      <a:effectRef idx="2">
-        <a:scrgbClr r="0" g="0" b="0"/>
-      </a:effectRef>
-      <a:fontRef idx="minor">
-        <a:schemeClr val="lt1"/>
-      </a:fontRef>
-    </dgm:style>
-  </dgm:styleLbl>
-  <dgm:styleLbl name="node4">
-    <dgm:scene3d>
-      <a:camera prst="orthographicFront"/>
-      <a:lightRig rig="threePt" dir="t"/>
-    </dgm:scene3d>
-    <dgm:sp3d/>
-    <dgm:txPr/>
-    <dgm:style>
-      <a:lnRef idx="0">
-        <a:scrgbClr r="0" g="0" b="0"/>
-      </a:lnRef>
-      <a:fillRef idx="3">
-        <a:scrgbClr r="0" g="0" b="0"/>
-      </a:fillRef>
-      <a:effectRef idx="2">
-        <a:scrgbClr r="0" g="0" b="0"/>
-      </a:effectRef>
-      <a:fontRef idx="minor">
-        <a:schemeClr val="lt1"/>
-      </a:fontRef>
-    </dgm:style>
-  </dgm:styleLbl>
-  <dgm:styleLbl name="fgImgPlace1">
-    <dgm:scene3d>
-      <a:camera prst="orthographicFront"/>
-      <a:lightRig rig="threePt" dir="t"/>
-    </dgm:scene3d>
-    <dgm:sp3d/>
-    <dgm:txPr/>
-    <dgm:style>
-      <a:lnRef idx="0">
-        <a:scrgbClr r="0" g="0" b="0"/>
-      </a:lnRef>
-      <a:fillRef idx="1">
-        <a:scrgbClr r="0" g="0" b="0"/>
-      </a:fillRef>
-      <a:effectRef idx="2">
-        <a:scrgbClr r="0" g="0" b="0"/>
-      </a:effectRef>
-      <a:fontRef idx="minor"/>
-    </dgm:style>
-  </dgm:styleLbl>
-  <dgm:styleLbl name="alignImgPlace1">
-    <dgm:scene3d>
-      <a:camera prst="orthographicFront"/>
-      <a:lightRig rig="threePt" dir="t"/>
-    </dgm:scene3d>
-    <dgm:sp3d/>
-    <dgm:txPr/>
-    <dgm:style>
-      <a:lnRef idx="0">
-        <a:scrgbClr r="0" g="0" b="0"/>
-      </a:lnRef>
-      <a:fillRef idx="1">
-        <a:scrgbClr r="0" g="0" b="0"/>
-      </a:fillRef>
-      <a:effectRef idx="2">
-        <a:scrgbClr r="0" g="0" b="0"/>
-      </a:effectRef>
-      <a:fontRef idx="minor"/>
-    </dgm:style>
-  </dgm:styleLbl>
-  <dgm:styleLbl name="bgImgPlace1">
-    <dgm:scene3d>
-      <a:camera prst="orthographicFront"/>
-      <a:lightRig rig="threePt" dir="t"/>
-    </dgm:scene3d>
-    <dgm:sp3d/>
-    <dgm:txPr/>
-    <dgm:style>
-      <a:lnRef idx="0">
-        <a:scrgbClr r="0" g="0" b="0"/>
-      </a:lnRef>
-      <a:fillRef idx="1">
-        <a:scrgbClr r="0" g="0" b="0"/>
-      </a:fillRef>
-      <a:effectRef idx="2">
-        <a:scrgbClr r="0" g="0" b="0"/>
-      </a:effectRef>
-      <a:fontRef idx="minor"/>
-    </dgm:style>
-  </dgm:styleLbl>
-  <dgm:styleLbl name="sibTrans2D1">
-    <dgm:scene3d>
-      <a:camera prst="orthographicFront"/>
-      <a:lightRig rig="threePt" dir="t"/>
-    </dgm:scene3d>
-    <dgm:sp3d/>
-    <dgm:txPr/>
-    <dgm:style>
-      <a:lnRef idx="0">
-        <a:scrgbClr r="0" g="0" b="0"/>
-      </a:lnRef>
-      <a:fillRef idx="3">
-        <a:scrgbClr r="0" g="0" b="0"/>
-      </a:fillRef>
-      <a:effectRef idx="2">
-        <a:scrgbClr r="0" g="0" b="0"/>
-      </a:effectRef>
-      <a:fontRef idx="minor">
-        <a:schemeClr val="lt1"/>
-      </a:fontRef>
-    </dgm:style>
-  </dgm:styleLbl>
-  <dgm:styleLbl name="fgSibTrans2D1">
-    <dgm:scene3d>
-      <a:camera prst="orthographicFront"/>
-      <a:lightRig rig="threePt" dir="t"/>
-    </dgm:scene3d>
-    <dgm:sp3d/>
-    <dgm:txPr/>
-    <dgm:style>
-      <a:lnRef idx="0">
-        <a:scrgbClr r="0" g="0" b="0"/>
-      </a:lnRef>
-      <a:fillRef idx="3">
-        <a:scrgbClr r="0" g="0" b="0"/>
-      </a:fillRef>
-      <a:effectRef idx="2">
-        <a:scrgbClr r="0" g="0" b="0"/>
-      </a:effectRef>
-      <a:fontRef idx="minor">
-        <a:schemeClr val="lt1"/>
-      </a:fontRef>
-    </dgm:style>
-  </dgm:styleLbl>
-  <dgm:styleLbl name="bgSibTrans2D1">
-    <dgm:scene3d>
-      <a:camera prst="orthographicFront"/>
-      <a:lightRig rig="threePt" dir="t"/>
-    </dgm:scene3d>
-    <dgm:sp3d/>
-    <dgm:txPr/>
-    <dgm:style>
-      <a:lnRef idx="0">
-        <a:scrgbClr r="0" g="0" b="0"/>
-      </a:lnRef>
-      <a:fillRef idx="3">
-        <a:scrgbClr r="0" g="0" b="0"/>
-      </a:fillRef>
-      <a:effectRef idx="2">
-        <a:scrgbClr r="0" g="0" b="0"/>
-      </a:effectRef>
-      <a:fontRef idx="minor">
-        <a:schemeClr val="lt1"/>
-      </a:fontRef>
-    </dgm:style>
-  </dgm:styleLbl>
-  <dgm:styleLbl name="sibTrans1D1">
-    <dgm:scene3d>
-      <a:camera prst="orthographicFront"/>
-      <a:lightRig rig="threePt" dir="t"/>
-    </dgm:scene3d>
-    <dgm:sp3d/>
-    <dgm:txPr/>
-    <dgm:style>
-      <a:lnRef idx="1">
-        <a:scrgbClr r="0" g="0" b="0"/>
-      </a:lnRef>
-      <a:fillRef idx="0">
-        <a:scrgbClr r="0" g="0" b="0"/>
-      </a:fillRef>
-      <a:effectRef idx="0">
-        <a:scrgbClr r="0" g="0" b="0"/>
-      </a:effectRef>
-      <a:fontRef idx="minor"/>
-    </dgm:style>
-  </dgm:styleLbl>
-  <dgm:styleLbl name="callout">
-    <dgm:scene3d>
-      <a:camera prst="orthographicFront"/>
-      <a:lightRig rig="threePt" dir="t"/>
-    </dgm:scene3d>
-    <dgm:sp3d/>
-    <dgm:txPr/>
-    <dgm:style>
-      <a:lnRef idx="2">
-        <a:scrgbClr r="0" g="0" b="0"/>
-      </a:lnRef>
-      <a:fillRef idx="1">
-        <a:scrgbClr r="0" g="0" b="0"/>
-      </a:fillRef>
-      <a:effectRef idx="1">
-        <a:scrgbClr r="0" g="0" b="0"/>
-      </a:effectRef>
-      <a:fontRef idx="minor"/>
-    </dgm:style>
-  </dgm:styleLbl>
-  <dgm:styleLbl name="asst0">
-    <dgm:scene3d>
-      <a:camera prst="orthographicFront"/>
-      <a:lightRig rig="threePt" dir="t"/>
-    </dgm:scene3d>
-    <dgm:sp3d/>
-    <dgm:txPr/>
-    <dgm:style>
-      <a:lnRef idx="0">
-        <a:scrgbClr r="0" g="0" b="0"/>
-      </a:lnRef>
-      <a:fillRef idx="3">
-        <a:scrgbClr r="0" g="0" b="0"/>
-      </a:fillRef>
-      <a:effectRef idx="2">
-        <a:scrgbClr r="0" g="0" b="0"/>
-      </a:effectRef>
-      <a:fontRef idx="minor">
-        <a:schemeClr val="lt1"/>
-      </a:fontRef>
-    </dgm:style>
-  </dgm:styleLbl>
-  <dgm:styleLbl name="asst1">
-    <dgm:scene3d>
-      <a:camera prst="orthographicFront"/>
-      <a:lightRig rig="threePt" dir="t"/>
-    </dgm:scene3d>
-    <dgm:sp3d/>
-    <dgm:txPr/>
-    <dgm:style>
-      <a:lnRef idx="0">
-        <a:scrgbClr r="0" g="0" b="0"/>
-      </a:lnRef>
-      <a:fillRef idx="3">
-        <a:scrgbClr r="0" g="0" b="0"/>
-      </a:fillRef>
-      <a:effectRef idx="2">
-        <a:scrgbClr r="0" g="0" b="0"/>
-      </a:effectRef>
-      <a:fontRef idx="minor">
-        <a:schemeClr val="lt1"/>
-      </a:fontRef>
-    </dgm:style>
-  </dgm:styleLbl>
-  <dgm:styleLbl name="asst2">
-    <dgm:scene3d>
-      <a:camera prst="orthographicFront"/>
-      <a:lightRig rig="threePt" dir="t"/>
-    </dgm:scene3d>
-    <dgm:sp3d/>
-    <dgm:txPr/>
-    <dgm:style>
-      <a:lnRef idx="0">
-        <a:scrgbClr r="0" g="0" b="0"/>
-      </a:lnRef>
-      <a:fillRef idx="3">
-        <a:scrgbClr r="0" g="0" b="0"/>
-      </a:fillRef>
-      <a:effectRef idx="2">
-        <a:scrgbClr r="0" g="0" b="0"/>
-      </a:effectRef>
-      <a:fontRef idx="minor">
-        <a:schemeClr val="lt1"/>
-      </a:fontRef>
-    </dgm:style>
-  </dgm:styleLbl>
-  <dgm:styleLbl name="asst3">
-    <dgm:scene3d>
-      <a:camera prst="orthographicFront"/>
-      <a:lightRig rig="threePt" dir="t"/>
-    </dgm:scene3d>
-    <dgm:sp3d/>
-    <dgm:txPr/>
-    <dgm:style>
-      <a:lnRef idx="0">
-        <a:scrgbClr r="0" g="0" b="0"/>
-      </a:lnRef>
-      <a:fillRef idx="3">
-        <a:scrgbClr r="0" g="0" b="0"/>
-      </a:fillRef>
-      <a:effectRef idx="2">
-        <a:scrgbClr r="0" g="0" b="0"/>
-      </a:effectRef>
-      <a:fontRef idx="minor">
-        <a:schemeClr val="lt1"/>
-      </a:fontRef>
-    </dgm:style>
-  </dgm:styleLbl>
-  <dgm:styleLbl name="asst4">
-    <dgm:scene3d>
-      <a:camera prst="orthographicFront"/>
-      <a:lightRig rig="threePt" dir="t"/>
-    </dgm:scene3d>
-    <dgm:sp3d/>
-    <dgm:txPr/>
-    <dgm:style>
-      <a:lnRef idx="0">
-        <a:scrgbClr r="0" g="0" b="0"/>
-      </a:lnRef>
-      <a:fillRef idx="3">
-        <a:scrgbClr r="0" g="0" b="0"/>
-      </a:fillRef>
-      <a:effectRef idx="2">
-        <a:scrgbClr r="0" g="0" b="0"/>
-      </a:effectRef>
-      <a:fontRef idx="minor">
-        <a:schemeClr val="lt1"/>
-      </a:fontRef>
-    </dgm:style>
-  </dgm:styleLbl>
-  <dgm:styleLbl name="parChTrans2D1">
-    <dgm:scene3d>
-      <a:camera prst="orthographicFront"/>
-      <a:lightRig rig="threePt" dir="t"/>
-    </dgm:scene3d>
-    <dgm:sp3d/>
-    <dgm:txPr/>
-    <dgm:style>
-      <a:lnRef idx="0">
-        <a:scrgbClr r="0" g="0" b="0"/>
-      </a:lnRef>
-      <a:fillRef idx="3">
-        <a:scrgbClr r="0" g="0" b="0"/>
-      </a:fillRef>
-      <a:effectRef idx="2">
-        <a:scrgbClr r="0" g="0" b="0"/>
-      </a:effectRef>
-      <a:fontRef idx="minor">
-        <a:schemeClr val="lt1"/>
-      </a:fontRef>
-    </dgm:style>
-  </dgm:styleLbl>
-  <dgm:styleLbl name="parChTrans2D2">
-    <dgm:scene3d>
-      <a:camera prst="orthographicFront"/>
-      <a:lightRig rig="threePt" dir="t"/>
-    </dgm:scene3d>
-    <dgm:sp3d/>
-    <dgm:txPr/>
-    <dgm:style>
-      <a:lnRef idx="0">
-        <a:scrgbClr r="0" g="0" b="0"/>
-      </a:lnRef>
-      <a:fillRef idx="3">
-        <a:scrgbClr r="0" g="0" b="0"/>
-      </a:fillRef>
-      <a:effectRef idx="2">
-        <a:scrgbClr r="0" g="0" b="0"/>
-      </a:effectRef>
-      <a:fontRef idx="minor">
-        <a:schemeClr val="lt1"/>
-      </a:fontRef>
-    </dgm:style>
-  </dgm:styleLbl>
-  <dgm:styleLbl name="parChTrans2D3">
-    <dgm:scene3d>
-      <a:camera prst="orthographicFront"/>
-      <a:lightRig rig="threePt" dir="t"/>
-    </dgm:scene3d>
-    <dgm:sp3d/>
-    <dgm:txPr/>
-    <dgm:style>
-      <a:lnRef idx="1">
-        <a:scrgbClr r="0" g="0" b="0"/>
-      </a:lnRef>
-      <a:fillRef idx="3">
-        <a:scrgbClr r="0" g="0" b="0"/>
-      </a:fillRef>
-      <a:effectRef idx="2">
-        <a:scrgbClr r="0" g="0" b="0"/>
-      </a:effectRef>
-      <a:fontRef idx="minor">
-        <a:schemeClr val="lt1"/>
-      </a:fontRef>
-    </dgm:style>
-  </dgm:styleLbl>
-  <dgm:styleLbl name="parChTrans2D4">
-    <dgm:scene3d>
-      <a:camera prst="orthographicFront"/>
-      <a:lightRig rig="threePt" dir="t"/>
-    </dgm:scene3d>
-    <dgm:sp3d/>
-    <dgm:txPr/>
-    <dgm:style>
-      <a:lnRef idx="1">
-        <a:scrgbClr r="0" g="0" b="0"/>
-      </a:lnRef>
-      <a:fillRef idx="3">
-        <a:scrgbClr r="0" g="0" b="0"/>
-      </a:fillRef>
-      <a:effectRef idx="2">
-        <a:scrgbClr r="0" g="0" b="0"/>
-      </a:effectRef>
-      <a:fontRef idx="minor">
-        <a:schemeClr val="lt1"/>
-      </a:fontRef>
-    </dgm:style>
-  </dgm:styleLbl>
-  <dgm:styleLbl name="parChTrans1D1">
-    <dgm:scene3d>
-      <a:camera prst="orthographicFront"/>
-      <a:lightRig rig="threePt" dir="t"/>
-    </dgm:scene3d>
-    <dgm:sp3d/>
-    <dgm:txPr/>
-    <dgm:style>
-      <a:lnRef idx="1">
-        <a:scrgbClr r="0" g="0" b="0"/>
-      </a:lnRef>
-      <a:fillRef idx="0">
-        <a:scrgbClr r="0" g="0" b="0"/>
-      </a:fillRef>
-      <a:effectRef idx="0">
-        <a:scrgbClr r="0" g="0" b="0"/>
-      </a:effectRef>
-      <a:fontRef idx="minor"/>
-    </dgm:style>
-  </dgm:styleLbl>
-  <dgm:styleLbl name="parChTrans1D2">
-    <dgm:scene3d>
-      <a:camera prst="orthographicFront"/>
-      <a:lightRig rig="threePt" dir="t"/>
-    </dgm:scene3d>
-    <dgm:sp3d/>
-    <dgm:txPr/>
-    <dgm:style>
-      <a:lnRef idx="1">
-        <a:scrgbClr r="0" g="0" b="0"/>
-      </a:lnRef>
-      <a:fillRef idx="0">
-        <a:scrgbClr r="0" g="0" b="0"/>
-      </a:fillRef>
-      <a:effectRef idx="0">
-        <a:scrgbClr r="0" g="0" b="0"/>
-      </a:effectRef>
-      <a:fontRef idx="minor"/>
-    </dgm:style>
-  </dgm:styleLbl>
-  <dgm:styleLbl name="parChTrans1D3">
-    <dgm:scene3d>
-      <a:camera prst="orthographicFront"/>
-      <a:lightRig rig="threePt" dir="t"/>
-    </dgm:scene3d>
-    <dgm:sp3d/>
-    <dgm:txPr/>
-    <dgm:style>
-      <a:lnRef idx="1">
-        <a:scrgbClr r="0" g="0" b="0"/>
-      </a:lnRef>
-      <a:fillRef idx="0">
-        <a:scrgbClr r="0" g="0" b="0"/>
-      </a:fillRef>
-      <a:effectRef idx="0">
-        <a:scrgbClr r="0" g="0" b="0"/>
-      </a:effectRef>
-      <a:fontRef idx="minor"/>
-    </dgm:style>
-  </dgm:styleLbl>
-  <dgm:styleLbl name="parChTrans1D4">
-    <dgm:scene3d>
-      <a:camera prst="orthographicFront"/>
-      <a:lightRig rig="threePt" dir="t"/>
-    </dgm:scene3d>
-    <dgm:sp3d/>
-    <dgm:txPr/>
-    <dgm:style>
-      <a:lnRef idx="1">
-        <a:scrgbClr r="0" g="0" b="0"/>
-      </a:lnRef>
-      <a:fillRef idx="0">
-        <a:scrgbClr r="0" g="0" b="0"/>
-      </a:fillRef>
-      <a:effectRef idx="0">
-        <a:scrgbClr r="0" g="0" b="0"/>
-      </a:effectRef>
-      <a:fontRef idx="minor"/>
-    </dgm:style>
-  </dgm:styleLbl>
-  <dgm:styleLbl name="fgAcc1">
-    <dgm:scene3d>
-      <a:camera prst="orthographicFront"/>
-      <a:lightRig rig="threePt" dir="t"/>
-    </dgm:scene3d>
-    <dgm:sp3d/>
-    <dgm:txPr/>
-    <dgm:style>
-      <a:lnRef idx="1">
-        <a:scrgbClr r="0" g="0" b="0"/>
-      </a:lnRef>
-      <a:fillRef idx="1">
-        <a:scrgbClr r="0" g="0" b="0"/>
-      </a:fillRef>
-      <a:effectRef idx="0">
-        <a:scrgbClr r="0" g="0" b="0"/>
-      </a:effectRef>
-      <a:fontRef idx="minor"/>
-    </dgm:style>
-  </dgm:styleLbl>
-  <dgm:styleLbl name="conFgAcc1">
-    <dgm:scene3d>
-      <a:camera prst="orthographicFront"/>
-      <a:lightRig rig="threePt" dir="t"/>
-    </dgm:scene3d>
-    <dgm:sp3d/>
-    <dgm:txPr/>
-    <dgm:style>
-      <a:lnRef idx="1">
-        <a:scrgbClr r="0" g="0" b="0"/>
-      </a:lnRef>
-      <a:fillRef idx="1">
-        <a:scrgbClr r="0" g="0" b="0"/>
-      </a:fillRef>
-      <a:effectRef idx="0">
-        <a:scrgbClr r="0" g="0" b="0"/>
-      </a:effectRef>
-      <a:fontRef idx="minor"/>
-    </dgm:style>
-  </dgm:styleLbl>
-  <dgm:styleLbl name="alignAcc1">
-    <dgm:scene3d>
-      <a:camera prst="orthographicFront"/>
-      <a:lightRig rig="threePt" dir="t"/>
-    </dgm:scene3d>
-    <dgm:sp3d/>
-    <dgm:txPr/>
-    <dgm:style>
-      <a:lnRef idx="1">
-        <a:scrgbClr r="0" g="0" b="0"/>
-      </a:lnRef>
-      <a:fillRef idx="1">
-        <a:scrgbClr r="0" g="0" b="0"/>
-      </a:fillRef>
-      <a:effectRef idx="0">
-        <a:scrgbClr r="0" g="0" b="0"/>
-      </a:effectRef>
-      <a:fontRef idx="minor"/>
-    </dgm:style>
-  </dgm:styleLbl>
-  <dgm:styleLbl name="trAlignAcc1">
-    <dgm:scene3d>
-      <a:camera prst="orthographicFront"/>
-      <a:lightRig rig="threePt" dir="t"/>
-    </dgm:scene3d>
-    <dgm:sp3d/>
-    <dgm:txPr/>
-    <dgm:style>
-      <a:lnRef idx="1">
-        <a:scrgbClr r="0" g="0" b="0"/>
-      </a:lnRef>
-      <a:fillRef idx="1">
-        <a:scrgbClr r="0" g="0" b="0"/>
-      </a:fillRef>
-      <a:effectRef idx="0">
-        <a:scrgbClr r="0" g="0" b="0"/>
-      </a:effectRef>
-      <a:fontRef idx="minor"/>
-    </dgm:style>
-  </dgm:styleLbl>
-  <dgm:styleLbl name="bgAcc1">
-    <dgm:scene3d>
-      <a:camera prst="orthographicFront"/>
-      <a:lightRig rig="threePt" dir="t"/>
-    </dgm:scene3d>
-    <dgm:sp3d/>
-    <dgm:txPr/>
-    <dgm:style>
-      <a:lnRef idx="1">
-        <a:scrgbClr r="0" g="0" b="0"/>
-      </a:lnRef>
-      <a:fillRef idx="1">
-        <a:scrgbClr r="0" g="0" b="0"/>
-      </a:fillRef>
-      <a:effectRef idx="0">
-        <a:scrgbClr r="0" g="0" b="0"/>
-      </a:effectRef>
-      <a:fontRef idx="minor"/>
-    </dgm:style>
-  </dgm:styleLbl>
-  <dgm:styleLbl name="solidFgAcc1">
-    <dgm:scene3d>
-      <a:camera prst="orthographicFront"/>
-      <a:lightRig rig="threePt" dir="t"/>
-    </dgm:scene3d>
-    <dgm:sp3d/>
-    <dgm:txPr/>
-    <dgm:style>
-      <a:lnRef idx="1">
-        <a:scrgbClr r="0" g="0" b="0"/>
-      </a:lnRef>
-      <a:fillRef idx="1">
-        <a:scrgbClr r="0" g="0" b="0"/>
-      </a:fillRef>
-      <a:effectRef idx="0">
-        <a:scrgbClr r="0" g="0" b="0"/>
-      </a:effectRef>
-      <a:fontRef idx="minor"/>
-    </dgm:style>
-  </dgm:styleLbl>
-  <dgm:styleLbl name="solidAlignAcc1">
-    <dgm:scene3d>
-      <a:camera prst="orthographicFront"/>
-      <a:lightRig rig="threePt" dir="t"/>
-    </dgm:scene3d>
-    <dgm:sp3d/>
-    <dgm:txPr/>
-    <dgm:style>
-      <a:lnRef idx="1">
-        <a:scrgbClr r="0" g="0" b="0"/>
-      </a:lnRef>
-      <a:fillRef idx="1">
-        <a:scrgbClr r="0" g="0" b="0"/>
-      </a:fillRef>
-      <a:effectRef idx="0">
-        <a:scrgbClr r="0" g="0" b="0"/>
-      </a:effectRef>
-      <a:fontRef idx="minor"/>
-    </dgm:style>
-  </dgm:styleLbl>
-  <dgm:styleLbl name="solidBgAcc1">
-    <dgm:scene3d>
-      <a:camera prst="orthographicFront"/>
-      <a:lightRig rig="threePt" dir="t"/>
-    </dgm:scene3d>
-    <dgm:sp3d/>
-    <dgm:txPr/>
-    <dgm:style>
-      <a:lnRef idx="1">
-        <a:scrgbClr r="0" g="0" b="0"/>
-      </a:lnRef>
-      <a:fillRef idx="1">
-        <a:scrgbClr r="0" g="0" b="0"/>
-      </a:fillRef>
-      <a:effectRef idx="0">
-        <a:scrgbClr r="0" g="0" b="0"/>
-      </a:effectRef>
-      <a:fontRef idx="minor"/>
-    </dgm:style>
-  </dgm:styleLbl>
-  <dgm:styleLbl name="fgAccFollowNode1">
-    <dgm:scene3d>
-      <a:camera prst="orthographicFront"/>
-      <a:lightRig rig="threePt" dir="t"/>
-    </dgm:scene3d>
-    <dgm:sp3d/>
-    <dgm:txPr/>
-    <dgm:style>
-      <a:lnRef idx="1">
-        <a:scrgbClr r="0" g="0" b="0"/>
-      </a:lnRef>
-      <a:fillRef idx="1">
-        <a:scrgbClr r="0" g="0" b="0"/>
-      </a:fillRef>
-      <a:effectRef idx="0">
-        <a:scrgbClr r="0" g="0" b="0"/>
-      </a:effectRef>
-      <a:fontRef idx="minor"/>
-    </dgm:style>
-  </dgm:styleLbl>
-  <dgm:styleLbl name="alignAccFollowNode1">
-    <dgm:scene3d>
-      <a:camera prst="orthographicFront"/>
-      <a:lightRig rig="threePt" dir="t"/>
-    </dgm:scene3d>
-    <dgm:sp3d/>
-    <dgm:txPr/>
-    <dgm:style>
-      <a:lnRef idx="1">
-        <a:scrgbClr r="0" g="0" b="0"/>
-      </a:lnRef>
-      <a:fillRef idx="1">
-        <a:scrgbClr r="0" g="0" b="0"/>
-      </a:fillRef>
-      <a:effectRef idx="0">
-        <a:scrgbClr r="0" g="0" b="0"/>
-      </a:effectRef>
-      <a:fontRef idx="minor"/>
-    </dgm:style>
-  </dgm:styleLbl>
-  <dgm:styleLbl name="bgAccFollowNode1">
-    <dgm:scene3d>
-      <a:camera prst="orthographicFront"/>
-      <a:lightRig rig="threePt" dir="t"/>
-    </dgm:scene3d>
-    <dgm:sp3d/>
-    <dgm:txPr/>
-    <dgm:style>
-      <a:lnRef idx="1">
-        <a:scrgbClr r="0" g="0" b="0"/>
-      </a:lnRef>
-      <a:fillRef idx="1">
-        <a:scrgbClr r="0" g="0" b="0"/>
-      </a:fillRef>
-      <a:effectRef idx="0">
-        <a:scrgbClr r="0" g="0" b="0"/>
-      </a:effectRef>
-      <a:fontRef idx="minor"/>
-    </dgm:style>
-  </dgm:styleLbl>
-  <dgm:styleLbl name="fgAcc0">
-    <dgm:scene3d>
-      <a:camera prst="orthographicFront"/>
-      <a:lightRig rig="threePt" dir="t"/>
-    </dgm:scene3d>
-    <dgm:sp3d/>
-    <dgm:txPr/>
-    <dgm:style>
-      <a:lnRef idx="1">
-        <a:scrgbClr r="0" g="0" b="0"/>
-      </a:lnRef>
-      <a:fillRef idx="1">
-        <a:scrgbClr r="0" g="0" b="0"/>
-      </a:fillRef>
-      <a:effectRef idx="0">
-        <a:scrgbClr r="0" g="0" b="0"/>
-      </a:effectRef>
-      <a:fontRef idx="minor"/>
-    </dgm:style>
-  </dgm:styleLbl>
-  <dgm:styleLbl name="fgAcc2">
-    <dgm:scene3d>
-      <a:camera prst="orthographicFront"/>
-      <a:lightRig rig="threePt" dir="t"/>
-    </dgm:scene3d>
-    <dgm:sp3d/>
-    <dgm:txPr/>
-    <dgm:style>
-      <a:lnRef idx="1">
-        <a:scrgbClr r="0" g="0" b="0"/>
-      </a:lnRef>
-      <a:fillRef idx="1">
-        <a:scrgbClr r="0" g="0" b="0"/>
-      </a:fillRef>
-      <a:effectRef idx="0">
-        <a:scrgbClr r="0" g="0" b="0"/>
-      </a:effectRef>
-      <a:fontRef idx="minor"/>
-    </dgm:style>
-  </dgm:styleLbl>
-  <dgm:styleLbl name="fgAcc3">
-    <dgm:scene3d>
-      <a:camera prst="orthographicFront"/>
-      <a:lightRig rig="threePt" dir="t"/>
-    </dgm:scene3d>
-    <dgm:sp3d/>
-    <dgm:txPr/>
-    <dgm:style>
-      <a:lnRef idx="1">
-        <a:scrgbClr r="0" g="0" b="0"/>
-      </a:lnRef>
-      <a:fillRef idx="1">
-        <a:scrgbClr r="0" g="0" b="0"/>
-      </a:fillRef>
-      <a:effectRef idx="0">
-        <a:scrgbClr r="0" g="0" b="0"/>
-      </a:effectRef>
-      <a:fontRef idx="minor"/>
-    </dgm:style>
-  </dgm:styleLbl>
-  <dgm:styleLbl name="fgAcc4">
-    <dgm:scene3d>
-      <a:camera prst="orthographicFront"/>
-      <a:lightRig rig="threePt" dir="t"/>
-    </dgm:scene3d>
-    <dgm:sp3d/>
-    <dgm:txPr/>
-    <dgm:style>
-      <a:lnRef idx="1">
-        <a:scrgbClr r="0" g="0" b="0"/>
-      </a:lnRef>
-      <a:fillRef idx="1">
-        <a:scrgbClr r="0" g="0" b="0"/>
-      </a:fillRef>
-      <a:effectRef idx="0">
-        <a:scrgbClr r="0" g="0" b="0"/>
-      </a:effectRef>
-      <a:fontRef idx="minor"/>
-    </dgm:style>
-  </dgm:styleLbl>
-  <dgm:styleLbl name="bgShp">
-    <dgm:scene3d>
-      <a:camera prst="orthographicFront"/>
-      <a:lightRig rig="threePt" dir="t"/>
-    </dgm:scene3d>
-    <dgm:sp3d/>
-    <dgm:txPr/>
-    <dgm:style>
-      <a:lnRef idx="0">
-        <a:scrgbClr r="0" g="0" b="0"/>
-      </a:lnRef>
-      <a:fillRef idx="1">
-        <a:scrgbClr r="0" g="0" b="0"/>
-      </a:fillRef>
-      <a:effectRef idx="2">
-        <a:scrgbClr r="0" g="0" b="0"/>
-      </a:effectRef>
-      <a:fontRef idx="minor"/>
-    </dgm:style>
-  </dgm:styleLbl>
-  <dgm:styleLbl name="dkBgShp">
-    <dgm:scene3d>
-      <a:camera prst="orthographicFront"/>
-      <a:lightRig rig="threePt" dir="t"/>
-    </dgm:scene3d>
-    <dgm:sp3d/>
-    <dgm:txPr/>
-    <dgm:style>
-      <a:lnRef idx="0">
-        <a:scrgbClr r="0" g="0" b="0"/>
-      </a:lnRef>
-      <a:fillRef idx="1">
-        <a:scrgbClr r="0" g="0" b="0"/>
-      </a:fillRef>
-      <a:effectRef idx="2">
-        <a:scrgbClr r="0" g="0" b="0"/>
-      </a:effectRef>
-      <a:fontRef idx="minor"/>
-    </dgm:style>
-  </dgm:styleLbl>
-  <dgm:styleLbl name="trBgShp">
-    <dgm:scene3d>
-      <a:camera prst="orthographicFront"/>
-      <a:lightRig rig="threePt" dir="t"/>
-    </dgm:scene3d>
-    <dgm:sp3d/>
-    <dgm:txPr/>
-    <dgm:style>
-      <a:lnRef idx="0">
-        <a:scrgbClr r="0" g="0" b="0"/>
-      </a:lnRef>
-      <a:fillRef idx="1">
-        <a:scrgbClr r="0" g="0" b="0"/>
-      </a:fillRef>
-      <a:effectRef idx="0">
-        <a:scrgbClr r="0" g="0" b="0"/>
-      </a:effectRef>
-      <a:fontRef idx="minor"/>
-    </dgm:style>
-  </dgm:styleLbl>
-  <dgm:styleLbl name="fgShp">
-    <dgm:scene3d>
-      <a:camera prst="orthographicFront"/>
-      <a:lightRig rig="threePt" dir="t"/>
-    </dgm:scene3d>
-    <dgm:sp3d/>
-    <dgm:txPr/>
-    <dgm:style>
-      <a:lnRef idx="0">
-        <a:scrgbClr r="0" g="0" b="0"/>
-      </a:lnRef>
-      <a:fillRef idx="3">
-        <a:scrgbClr r="0" g="0" b="0"/>
-      </a:fillRef>
-      <a:effectRef idx="2">
-        <a:scrgbClr r="0" g="0" b="0"/>
-      </a:effectRef>
-      <a:fontRef idx="minor"/>
-    </dgm:style>
-  </dgm:styleLbl>
-  <dgm:styleLbl name="revTx">
-    <dgm:scene3d>
-      <a:camera prst="orthographicFront"/>
-      <a:lightRig rig="threePt" dir="t"/>
-    </dgm:scene3d>
-    <dgm:sp3d/>
-    <dgm:txPr/>
-    <dgm:style>
-      <a:lnRef idx="0">
-        <a:scrgbClr r="0" g="0" b="0"/>
-      </a:lnRef>
-      <a:fillRef idx="0">
-        <a:scrgbClr r="0" g="0" b="0"/>
-      </a:fillRef>
-      <a:effectRef idx="0">
-        <a:scrgbClr r="0" g="0" b="0"/>
-      </a:effectRef>
-      <a:fontRef idx="minor"/>
-    </dgm:style>
-  </dgm:styleLbl>
-</dgm:styleDef>
 </file>
 
 <file path=ppt/notesMasters/notesMaster1.xml><?xml version="1.0" encoding="utf-8"?>
@@ -8999,7 +6568,13 @@
   <p:cSld>
     <p:spTree>
       <p:nvGrpSpPr>
-        <p:cNvPr id="1" name=""/>
+        <p:cNvPr id="1" name="">
+          <a:extLst>
+            <a:ext uri="{FF2B5EF4-FFF2-40B4-BE49-F238E27FC236}">
+              <a16:creationId xmlns:a16="http://schemas.microsoft.com/office/drawing/2014/main" id="{38321A40-E0F7-7BA3-C2CE-BA788D9341E3}"/>
+            </a:ext>
+          </a:extLst>
+        </p:cNvPr>
         <p:cNvGrpSpPr/>
         <p:nvPr/>
       </p:nvGrpSpPr>
@@ -9013,10 +6588,10 @@
       </p:grpSpPr>
       <p:sp>
         <p:nvSpPr>
-          <p:cNvPr id="2" name="Title 1">
-            <a:extLst>
-              <a:ext uri="{FF2B5EF4-FFF2-40B4-BE49-F238E27FC236}">
-                <a16:creationId xmlns:a16="http://schemas.microsoft.com/office/drawing/2014/main" id="{1299791A-8ADB-A88D-C7C2-790F8A869132}"/>
+          <p:cNvPr id="4" name="Title 3">
+            <a:extLst>
+              <a:ext uri="{FF2B5EF4-FFF2-40B4-BE49-F238E27FC236}">
+                <a16:creationId xmlns:a16="http://schemas.microsoft.com/office/drawing/2014/main" id="{CEE910E8-2ECC-E973-DE95-66349C667FEF}"/>
               </a:ext>
             </a:extLst>
           </p:cNvPr>
@@ -9027,53 +6602,195 @@
             <p:ph type="title"/>
           </p:nvPr>
         </p:nvSpPr>
-        <p:spPr/>
-        <p:txBody>
-          <a:bodyPr/>
-          <a:lstStyle/>
-          <a:p>
-            <a:r>
-              <a:rPr lang="en-US" dirty="0"/>
+        <p:spPr>
+          <a:xfrm>
+            <a:off x="630936" y="639520"/>
+            <a:ext cx="3429000" cy="1719072"/>
+          </a:xfrm>
+        </p:spPr>
+        <p:txBody>
+          <a:bodyPr vert="horz" lIns="91440" tIns="45720" rIns="91440" bIns="45720" rtlCol="0" anchor="b">
+            <a:normAutofit/>
+          </a:bodyPr>
+          <a:lstStyle/>
+          <a:p>
+            <a:r>
+              <a:rPr lang="en-US" sz="5400" b="1" kern="1200" dirty="0">
+                <a:solidFill>
+                  <a:schemeClr val="tx1"/>
+                </a:solidFill>
+                <a:latin typeface="+mj-lt"/>
+                <a:ea typeface="+mj-ea"/>
+                <a:cs typeface="+mj-cs"/>
+              </a:rPr>
               <a:t>Course Materials</a:t>
             </a:r>
           </a:p>
         </p:txBody>
       </p:sp>
-      <p:graphicFrame>
-        <p:nvGraphicFramePr>
-          <p:cNvPr id="4" name="Content Placeholder 3">
-            <a:extLst>
-              <a:ext uri="{FF2B5EF4-FFF2-40B4-BE49-F238E27FC236}">
-                <a16:creationId xmlns:a16="http://schemas.microsoft.com/office/drawing/2014/main" id="{7B6EBB5B-0EEF-632C-8D25-1552631523F6}"/>
-              </a:ext>
-            </a:extLst>
-          </p:cNvPr>
-          <p:cNvGraphicFramePr>
-            <a:graphicFrameLocks noGrp="1"/>
-          </p:cNvGraphicFramePr>
-          <p:nvPr>
-            <p:ph idx="1"/>
-            <p:extLst>
-              <p:ext uri="{D42A27DB-BD31-4B8C-83A1-F6EECF244321}">
-                <p14:modId xmlns:p14="http://schemas.microsoft.com/office/powerpoint/2010/main" val="3558641584"/>
-              </p:ext>
-            </p:extLst>
-          </p:nvPr>
-        </p:nvGraphicFramePr>
-        <p:xfrm>
-          <a:off x="838200" y="1825625"/>
-          <a:ext cx="10515600" cy="4351338"/>
-        </p:xfrm>
-        <a:graphic>
-          <a:graphicData uri="http://schemas.openxmlformats.org/drawingml/2006/diagram">
-            <dgm:relIds xmlns:dgm="http://schemas.openxmlformats.org/drawingml/2006/diagram" xmlns:r="http://schemas.openxmlformats.org/officeDocument/2006/relationships" r:dm="rId2" r:lo="rId3" r:qs="rId4" r:cs="rId5"/>
-          </a:graphicData>
-        </a:graphic>
-      </p:graphicFrame>
+      <p:sp>
+        <p:nvSpPr>
+          <p:cNvPr id="12" name="TextBox 11">
+            <a:extLst>
+              <a:ext uri="{FF2B5EF4-FFF2-40B4-BE49-F238E27FC236}">
+                <a16:creationId xmlns:a16="http://schemas.microsoft.com/office/drawing/2014/main" id="{2DA73307-1189-5099-5004-D54C5FE0F1F4}"/>
+              </a:ext>
+            </a:extLst>
+          </p:cNvPr>
+          <p:cNvSpPr txBox="1"/>
+          <p:nvPr/>
+        </p:nvSpPr>
+        <p:spPr>
+          <a:xfrm>
+            <a:off x="4696690" y="727096"/>
+            <a:ext cx="7079673" cy="4339650"/>
+          </a:xfrm>
+          <a:prstGeom prst="rect">
+            <a:avLst/>
+          </a:prstGeom>
+          <a:noFill/>
+        </p:spPr>
+        <p:txBody>
+          <a:bodyPr wrap="square">
+            <a:spAutoFit/>
+          </a:bodyPr>
+          <a:lstStyle/>
+          <a:p>
+            <a:pPr lvl="0"/>
+            <a:r>
+              <a:rPr lang="en-US" sz="2400" b="1" dirty="0"/>
+              <a:t>D2L</a:t>
+            </a:r>
+          </a:p>
+          <a:p>
+            <a:pPr marL="342900" lvl="0" indent="-342900">
+              <a:buFont typeface="Arial" panose="020B0604020202020204" pitchFamily="34" charset="0"/>
+              <a:buChar char="•"/>
+            </a:pPr>
+            <a:r>
+              <a:rPr lang="en-US" sz="2400" dirty="0"/>
+              <a:t>Presentations</a:t>
+            </a:r>
+          </a:p>
+          <a:p>
+            <a:pPr marL="342900" lvl="0" indent="-342900">
+              <a:buFont typeface="Arial" panose="020B0604020202020204" pitchFamily="34" charset="0"/>
+              <a:buChar char="•"/>
+            </a:pPr>
+            <a:r>
+              <a:rPr lang="en-US" sz="2400" dirty="0"/>
+              <a:t>Grades</a:t>
+            </a:r>
+          </a:p>
+          <a:p>
+            <a:pPr marL="342900" lvl="0" indent="-342900">
+              <a:buFont typeface="Arial" panose="020B0604020202020204" pitchFamily="34" charset="0"/>
+              <a:buChar char="•"/>
+            </a:pPr>
+            <a:r>
+              <a:rPr lang="en-US" sz="2400" dirty="0"/>
+              <a:t>Calendar</a:t>
+            </a:r>
+          </a:p>
+          <a:p>
+            <a:pPr marL="342900" lvl="0" indent="-342900">
+              <a:buFont typeface="Arial" panose="020B0604020202020204" pitchFamily="34" charset="0"/>
+              <a:buChar char="•"/>
+            </a:pPr>
+            <a:r>
+              <a:rPr lang="en-US" sz="2400" dirty="0"/>
+              <a:t>Announcements</a:t>
+            </a:r>
+          </a:p>
+          <a:p>
+            <a:pPr marL="342900" lvl="0" indent="-342900">
+              <a:buFont typeface="Arial" panose="020B0604020202020204" pitchFamily="34" charset="0"/>
+              <a:buChar char="•"/>
+            </a:pPr>
+            <a:r>
+              <a:rPr lang="en-US" sz="2400" dirty="0"/>
+              <a:t>Syllabus</a:t>
+            </a:r>
+            <a:br>
+              <a:rPr lang="en-US" sz="2400" dirty="0"/>
+            </a:br>
+            <a:endParaRPr lang="en-US" sz="2400" dirty="0"/>
+          </a:p>
+          <a:p>
+            <a:pPr lvl="0"/>
+            <a:r>
+              <a:rPr lang="en-US" sz="2400" b="1" dirty="0"/>
+              <a:t>GitHub</a:t>
+            </a:r>
+          </a:p>
+          <a:p>
+            <a:pPr marL="342900" lvl="0" indent="-342900">
+              <a:buFont typeface="Arial" panose="020B0604020202020204" pitchFamily="34" charset="0"/>
+              <a:buChar char="•"/>
+            </a:pPr>
+            <a:r>
+              <a:rPr lang="en-US" sz="2400" dirty="0"/>
+              <a:t>Demos</a:t>
+            </a:r>
+          </a:p>
+          <a:p>
+            <a:pPr marL="342900" lvl="0" indent="-342900">
+              <a:buFont typeface="Arial" panose="020B0604020202020204" pitchFamily="34" charset="0"/>
+              <a:buChar char="•"/>
+            </a:pPr>
+            <a:r>
+              <a:rPr lang="en-US" sz="2400" dirty="0"/>
+              <a:t>Semester Project Details</a:t>
+            </a:r>
+            <a:br>
+              <a:rPr lang="en-US" sz="2400" dirty="0"/>
+            </a:br>
+            <a:r>
+              <a:rPr lang="en-US" dirty="0">
+                <a:latin typeface="Consolas" panose="020B0609020204030204" pitchFamily="49" charset="0"/>
+                <a:cs typeface="Consolas" panose="020B0609020204030204" pitchFamily="49" charset="0"/>
+              </a:rPr>
+              <a:t>https://</a:t>
+            </a:r>
+            <a:r>
+              <a:rPr lang="en-US" dirty="0" err="1">
+                <a:latin typeface="Consolas" panose="020B0609020204030204" pitchFamily="49" charset="0"/>
+                <a:cs typeface="Consolas" panose="020B0609020204030204" pitchFamily="49" charset="0"/>
+              </a:rPr>
+              <a:t>github.com</a:t>
+            </a:r>
+            <a:r>
+              <a:rPr lang="en-US" dirty="0">
+                <a:latin typeface="Consolas" panose="020B0609020204030204" pitchFamily="49" charset="0"/>
+                <a:cs typeface="Consolas" panose="020B0609020204030204" pitchFamily="49" charset="0"/>
+              </a:rPr>
+              <a:t>/jeff-</a:t>
+            </a:r>
+            <a:r>
+              <a:rPr lang="en-US" dirty="0" err="1">
+                <a:latin typeface="Consolas" panose="020B0609020204030204" pitchFamily="49" charset="0"/>
+                <a:cs typeface="Consolas" panose="020B0609020204030204" pitchFamily="49" charset="0"/>
+              </a:rPr>
+              <a:t>adkisson</a:t>
+            </a:r>
+            <a:r>
+              <a:rPr lang="en-US" dirty="0">
+                <a:latin typeface="Consolas" panose="020B0609020204030204" pitchFamily="49" charset="0"/>
+                <a:cs typeface="Consolas" panose="020B0609020204030204" pitchFamily="49" charset="0"/>
+              </a:rPr>
+              <a:t>/swe-4743-spring-2026-oo-design.git</a:t>
+            </a:r>
+            <a:endParaRPr lang="en-US" sz="2400" dirty="0">
+              <a:latin typeface="Consolas" panose="020B0609020204030204" pitchFamily="49" charset="0"/>
+              <a:cs typeface="Consolas" panose="020B0609020204030204" pitchFamily="49" charset="0"/>
+            </a:endParaRPr>
+          </a:p>
+        </p:txBody>
+      </p:sp>
     </p:spTree>
     <p:extLst>
       <p:ext uri="{BB962C8B-B14F-4D97-AF65-F5344CB8AC3E}">
-        <p14:creationId xmlns:p14="http://schemas.microsoft.com/office/powerpoint/2010/main" val="102217497"/>
+        <p14:creationId xmlns:p14="http://schemas.microsoft.com/office/powerpoint/2010/main" val="1434598004"/>
       </p:ext>
     </p:extLst>
   </p:cSld>

</xml_diff>